<commit_message>
Update SOFTWARE PROJECT LAB -1.pptx
</commit_message>
<xml_diff>
--- a/SOFTWARE PROJECT LAB -1.pptx
+++ b/SOFTWARE PROJECT LAB -1.pptx
@@ -5760,6 +5760,13 @@
   <p:clrMapOvr>
     <a:masterClrMapping/>
   </p:clrMapOvr>
+  <p:timing>
+    <p:tnLst>
+      <p:par>
+        <p:cTn id="1" dur="indefinite" restart="never" nodeType="tmRoot"/>
+      </p:par>
+    </p:tnLst>
+  </p:timing>
 </p:sld>
 </file>
 
@@ -5825,7 +5832,11 @@
             </a:pPr>
             <a:r>
               <a:rPr lang="en-US" dirty="0" smtClean="0"/>
-              <a:t> ADDING FURTHER FEATURES FOR IMAGE PROCESSING INCLUDING EDGE DETECTION, GRAY-SCALING AND SMOOTHING</a:t>
+              <a:t> </a:t>
+            </a:r>
+            <a:r>
+              <a:rPr lang="en-US" dirty="0" smtClean="0"/>
+              <a:t>adding further features for image processing including edge detection, gray-scaling and smoothing</a:t>
             </a:r>
           </a:p>
           <a:p>
@@ -5836,8 +5847,9 @@
             </a:pPr>
             <a:r>
               <a:rPr lang="en-US" dirty="0" smtClean="0"/>
-              <a:t>ADDING USER MENU TO THE PROGRAM</a:t>
-            </a:r>
+              <a:t>adding user menu to the program</a:t>
+            </a:r>
+            <a:endParaRPr lang="en-US" dirty="0" smtClean="0"/>
           </a:p>
         </p:txBody>
       </p:sp>
@@ -6060,7 +6072,11 @@
             </a:br>
             <a:r>
               <a:rPr lang="en-US" b="1" dirty="0" smtClean="0"/>
-              <a:t>C, C++</a:t>
+              <a:t>C/ </a:t>
+            </a:r>
+            <a:r>
+              <a:rPr lang="en-US" b="1" dirty="0" smtClean="0"/>
+              <a:t>C++</a:t>
             </a:r>
             <a:endParaRPr lang="en-US" b="1" dirty="0"/>
           </a:p>
@@ -6076,6 +6092,13 @@
   <p:clrMapOvr>
     <a:masterClrMapping/>
   </p:clrMapOvr>
+  <p:timing>
+    <p:tnLst>
+      <p:par>
+        <p:cTn id="1" dur="indefinite" restart="never" nodeType="tmRoot"/>
+      </p:par>
+    </p:tnLst>
+  </p:timing>
 </p:sld>
 </file>
 
@@ -6987,10 +7010,10 @@
           <a:lstStyle/>
           <a:p>
             <a:r>
-              <a:rPr lang="en-US" dirty="0" smtClean="0"/>
+              <a:rPr lang="en-US" b="1" dirty="0" smtClean="0"/>
               <a:t>READING AN IMAGE</a:t>
             </a:r>
-            <a:endParaRPr lang="en-US" dirty="0"/>
+            <a:endParaRPr lang="en-US" b="1" dirty="0"/>
           </a:p>
         </p:txBody>
       </p:sp>
@@ -7681,7 +7704,7 @@
     </a:clrScheme>
     <a:fontScheme name="Organic">
       <a:majorFont>
-        <a:latin typeface="Garamond" panose="02020404030301010803"/>
+        <a:latin typeface="Garamond"/>
         <a:ea typeface=""/>
         <a:cs typeface=""/>
         <a:font script="Jpan" typeface="ＭＳ Ｐゴシック"/>
@@ -7716,7 +7739,7 @@
         <a:font script="Geor" typeface="Sylfaen"/>
       </a:majorFont>
       <a:minorFont>
-        <a:latin typeface="Garamond" panose="02020404030301010803"/>
+        <a:latin typeface="Garamond"/>
         <a:ea typeface=""/>
         <a:cs typeface=""/>
         <a:font script="Jpan" typeface="ＭＳ Ｐ明朝"/>
@@ -7865,7 +7888,7 @@
   <a:extraClrSchemeLst/>
   <a:extLst>
     <a:ext uri="{05A4C25C-085E-4340-85A3-A5531E510DB2}">
-      <thm15:themeFamily xmlns:thm15="http://schemas.microsoft.com/office/thememl/2012/main" name="Organic" id="{28CDC826-8792-45C0-861B-85EB3ADEDA33}" vid="{E4E49EB0-FB00-41F5-9359-4843D783A23D}"/>
+      <thm15:themeFamily xmlns:thm15="http://schemas.microsoft.com/office/thememl/2012/main" xmlns="" name="Organic" id="{28CDC826-8792-45C0-861B-85EB3ADEDA33}" vid="{E4E49EB0-FB00-41F5-9359-4843D783A23D}"/>
     </a:ext>
   </a:extLst>
 </a:theme>

</xml_diff>

<commit_message>
PPT edit and some file deleting
</commit_message>
<xml_diff>
--- a/SOFTWARE PROJECT LAB -1.pptx
+++ b/SOFTWARE PROJECT LAB -1.pptx
@@ -5,7 +5,7 @@
     <p:sldMasterId id="2147483648" r:id="rId1"/>
   </p:sldMasterIdLst>
   <p:notesMasterIdLst>
-    <p:notesMasterId r:id="rId13"/>
+    <p:notesMasterId r:id="rId16"/>
   </p:notesMasterIdLst>
   <p:sldIdLst>
     <p:sldId id="256" r:id="rId2"/>
@@ -18,7 +18,10 @@
     <p:sldId id="264" r:id="rId9"/>
     <p:sldId id="265" r:id="rId10"/>
     <p:sldId id="266" r:id="rId11"/>
-    <p:sldId id="262" r:id="rId12"/>
+    <p:sldId id="267" r:id="rId12"/>
+    <p:sldId id="268" r:id="rId13"/>
+    <p:sldId id="269" r:id="rId14"/>
+    <p:sldId id="262" r:id="rId15"/>
   </p:sldIdLst>
   <p:sldSz cx="12192000" cy="6858000"/>
   <p:notesSz cx="6858000" cy="9144000"/>
@@ -119,7 +122,7 @@
   </p:defaultTextStyle>
   <p:extLst>
     <p:ext uri="{EFAFB233-063F-42B5-8137-9DF3F51BA10A}">
-      <p15:sldGuideLst xmlns:p15="http://schemas.microsoft.com/office/powerpoint/2012/main"/>
+      <p15:sldGuideLst xmlns:p15="http://schemas.microsoft.com/office/powerpoint/2012/main" xmlns=""/>
     </p:ext>
   </p:extLst>
 </p:presentation>
@@ -207,7 +210,7 @@
           <a:p>
             <a:fld id="{97B222AC-AE83-4F10-813D-423883E1D47B}" type="datetimeFigureOut">
               <a:rPr lang="en-US" smtClean="0"/>
-              <a:t>3/11/2020</a:t>
+              <a:t>3/12/2020</a:t>
             </a:fld>
             <a:endParaRPr lang="en-US"/>
           </a:p>
@@ -783,7 +786,7 @@
           <a:p>
             <a:fld id="{40238DFA-E111-47B7-B40A-1D54CC4DC4CD}" type="datetime1">
               <a:rPr lang="en-US" smtClean="0"/>
-              <a:t>3/11/2020</a:t>
+              <a:t>3/12/2020</a:t>
             </a:fld>
             <a:endParaRPr lang="en-US" dirty="0"/>
           </a:p>
@@ -1111,7 +1114,7 @@
           <a:p>
             <a:fld id="{F063C0CC-977C-4252-B044-60CFE518587B}" type="datetime1">
               <a:rPr lang="en-US" smtClean="0"/>
-              <a:t>3/11/2020</a:t>
+              <a:t>3/12/2020</a:t>
             </a:fld>
             <a:endParaRPr lang="en-US" dirty="0"/>
           </a:p>
@@ -1355,7 +1358,7 @@
           <a:p>
             <a:fld id="{B1422DC1-AD17-4944-9003-EFD007690D0A}" type="datetime1">
               <a:rPr lang="en-US" smtClean="0"/>
-              <a:t>3/11/2020</a:t>
+              <a:t>3/12/2020</a:t>
             </a:fld>
             <a:endParaRPr lang="en-US" dirty="0"/>
           </a:p>
@@ -1697,7 +1700,7 @@
           <a:p>
             <a:fld id="{E18545D2-3E0D-4938-AA25-0382A569739B}" type="datetime1">
               <a:rPr lang="en-US" smtClean="0"/>
-              <a:t>3/11/2020</a:t>
+              <a:t>3/12/2020</a:t>
             </a:fld>
             <a:endParaRPr lang="en-US" dirty="0"/>
           </a:p>
@@ -2047,7 +2050,7 @@
           <a:p>
             <a:fld id="{1FB9E15F-D804-4FB8-B324-2D74DCB23BA3}" type="datetime1">
               <a:rPr lang="en-US" smtClean="0"/>
-              <a:t>3/11/2020</a:t>
+              <a:t>3/12/2020</a:t>
             </a:fld>
             <a:endParaRPr lang="en-US" dirty="0"/>
           </a:p>
@@ -2417,7 +2420,7 @@
           <a:p>
             <a:fld id="{5F10FD20-68BE-4437-9DE6-545CAB9E2591}" type="datetime1">
               <a:rPr lang="en-US" smtClean="0"/>
-              <a:t>3/11/2020</a:t>
+              <a:t>3/12/2020</a:t>
             </a:fld>
             <a:endParaRPr lang="en-US" dirty="0"/>
           </a:p>
@@ -2890,7 +2893,7 @@
           <a:p>
             <a:fld id="{79D50F07-4B4D-45B0-BD32-BBF4F8B3EDD4}" type="datetime1">
               <a:rPr lang="en-US" smtClean="0"/>
-              <a:t>3/11/2020</a:t>
+              <a:t>3/12/2020</a:t>
             </a:fld>
             <a:endParaRPr lang="en-US" dirty="0"/>
           </a:p>
@@ -3098,7 +3101,7 @@
           <a:p>
             <a:fld id="{3F5383E6-B98A-48BB-85BA-767815715D74}" type="datetime1">
               <a:rPr lang="en-US" smtClean="0"/>
-              <a:t>3/11/2020</a:t>
+              <a:t>3/12/2020</a:t>
             </a:fld>
             <a:endParaRPr lang="en-US" dirty="0"/>
           </a:p>
@@ -3312,7 +3315,7 @@
           <a:p>
             <a:fld id="{4B67787A-1745-418B-8BC7-65C417D0289F}" type="datetime1">
               <a:rPr lang="en-US" smtClean="0"/>
-              <a:t>3/11/2020</a:t>
+              <a:t>3/12/2020</a:t>
             </a:fld>
             <a:endParaRPr lang="en-US" dirty="0"/>
           </a:p>
@@ -3554,7 +3557,7 @@
           <a:p>
             <a:fld id="{4D895880-9CB1-4058-A583-50D547147BEC}" type="datetime1">
               <a:rPr lang="en-US" smtClean="0"/>
-              <a:t>3/11/2020</a:t>
+              <a:t>3/12/2020</a:t>
             </a:fld>
             <a:endParaRPr lang="en-US" dirty="0"/>
           </a:p>
@@ -3797,7 +3800,7 @@
           <a:p>
             <a:fld id="{1DCD2490-AFFC-4EAF-B91C-7D19AA4182CF}" type="datetime1">
               <a:rPr lang="en-US" smtClean="0"/>
-              <a:t>3/11/2020</a:t>
+              <a:t>3/12/2020</a:t>
             </a:fld>
             <a:endParaRPr lang="en-US" dirty="0"/>
           </a:p>
@@ -4105,7 +4108,7 @@
           <a:p>
             <a:fld id="{97A30C9E-52EF-448B-A767-82499E5273EA}" type="datetime1">
               <a:rPr lang="en-US" smtClean="0"/>
-              <a:t>3/11/2020</a:t>
+              <a:t>3/12/2020</a:t>
             </a:fld>
             <a:endParaRPr lang="en-US" dirty="0"/>
           </a:p>
@@ -4482,7 +4485,7 @@
           <a:p>
             <a:fld id="{DFEF93BC-D80F-4E5C-BD78-8A6C7B88EC09}" type="datetime1">
               <a:rPr lang="en-US" smtClean="0"/>
-              <a:t>3/11/2020</a:t>
+              <a:t>3/12/2020</a:t>
             </a:fld>
             <a:endParaRPr lang="en-US" dirty="0"/>
           </a:p>
@@ -4634,7 +4637,7 @@
           <a:p>
             <a:fld id="{02D6F11F-1986-40F9-8898-84FF6442DE8A}" type="datetime1">
               <a:rPr lang="en-US" smtClean="0"/>
-              <a:t>3/11/2020</a:t>
+              <a:t>3/12/2020</a:t>
             </a:fld>
             <a:endParaRPr lang="en-US" dirty="0"/>
           </a:p>
@@ -4763,7 +4766,7 @@
           <a:p>
             <a:fld id="{0C016015-D643-4180-8179-A9931FC0E77A}" type="datetime1">
               <a:rPr lang="en-US" smtClean="0"/>
-              <a:t>3/11/2020</a:t>
+              <a:t>3/12/2020</a:t>
             </a:fld>
             <a:endParaRPr lang="en-US" dirty="0"/>
           </a:p>
@@ -5014,7 +5017,7 @@
           <a:p>
             <a:fld id="{BF9370D3-E676-495A-9F1A-514AE823D41D}" type="datetime1">
               <a:rPr lang="en-US" smtClean="0"/>
-              <a:t>3/11/2020</a:t>
+              <a:t>3/12/2020</a:t>
             </a:fld>
             <a:endParaRPr lang="en-US" dirty="0"/>
           </a:p>
@@ -5332,7 +5335,7 @@
           <a:p>
             <a:fld id="{A2D3F368-EDD8-4AE7-A219-0737EC7AA614}" type="datetime1">
               <a:rPr lang="en-US" smtClean="0"/>
-              <a:t>3/11/2020</a:t>
+              <a:t>3/12/2020</a:t>
             </a:fld>
             <a:endParaRPr lang="en-US" dirty="0"/>
           </a:p>
@@ -5572,7 +5575,7 @@
           <a:p>
             <a:fld id="{9DB1FD19-3ED8-4EC3-A313-6E4ED055186E}" type="datetime1">
               <a:rPr lang="en-US" smtClean="0"/>
-              <a:t>3/11/2020</a:t>
+              <a:t>3/12/2020</a:t>
             </a:fld>
             <a:endParaRPr lang="en-US" dirty="0"/>
           </a:p>
@@ -6150,10 +6153,15 @@
             <p:ph type="subTitle" idx="1"/>
           </p:nvPr>
         </p:nvSpPr>
-        <p:spPr/>
+        <p:spPr>
+          <a:xfrm>
+            <a:off x="2692398" y="3464417"/>
+            <a:ext cx="6815669" cy="2034862"/>
+          </a:xfrm>
+        </p:spPr>
         <p:txBody>
           <a:bodyPr>
-            <a:normAutofit fontScale="85000" lnSpcReduction="20000"/>
+            <a:normAutofit fontScale="70000" lnSpcReduction="20000"/>
           </a:bodyPr>
           <a:lstStyle/>
           <a:p>
@@ -6171,8 +6179,22 @@
           <a:p>
             <a:r>
               <a:rPr lang="en-US" sz="3300" b="1" dirty="0" smtClean="0"/>
-              <a:t>ROLL: 1115</a:t>
-            </a:r>
+              <a:t>ROLL:BSSE 1115</a:t>
+            </a:r>
+          </a:p>
+          <a:p>
+            <a:r>
+              <a:rPr lang="en-US" sz="2600" dirty="0" smtClean="0"/>
+              <a:t>SUPERVISED BY :</a:t>
+            </a:r>
+          </a:p>
+          <a:p>
+            <a:r>
+              <a:rPr lang="en-US" sz="3300" b="1" dirty="0" smtClean="0"/>
+              <a:t>DR. AHMEDUL KABIR</a:t>
+            </a:r>
+          </a:p>
+          <a:p>
             <a:endParaRPr lang="en-US" sz="3300" b="1" dirty="0"/>
           </a:p>
         </p:txBody>
@@ -6198,7 +6220,7 @@
           <a:lstStyle/>
           <a:p>
             <a:fld id="{D57F1E4F-1CFF-5643-939E-217C01CDF565}" type="slidenum">
-              <a:rPr lang="en-US" sz="2800" smtClean="0"/>
+              <a:rPr lang="en-US" sz="3600" smtClean="0"/>
               <a:pPr/>
               <a:t>1</a:t>
             </a:fld>
@@ -6216,6 +6238,13 @@
   <p:clrMapOvr>
     <a:masterClrMapping/>
   </p:clrMapOvr>
+  <p:timing>
+    <p:tnLst>
+      <p:par>
+        <p:cTn id="1" dur="indefinite" restart="never" nodeType="tmRoot"/>
+      </p:par>
+    </p:tnLst>
+  </p:timing>
 </p:sld>
 </file>
 
@@ -6296,7 +6325,26 @@
             </a:pPr>
             <a:r>
               <a:rPr lang="en-US" sz="3200" dirty="0" smtClean="0"/>
-              <a:t>Adding user menu to the program</a:t>
+              <a:t>Adding user menu to the </a:t>
+            </a:r>
+            <a:r>
+              <a:rPr lang="en-US" sz="3200" dirty="0" smtClean="0"/>
+              <a:t>program</a:t>
+            </a:r>
+          </a:p>
+          <a:p>
+            <a:pPr>
+              <a:buClrTx/>
+              <a:buFont typeface="Wingdings" panose="05000000000000000000" pitchFamily="2" charset="2"/>
+              <a:buChar char="v"/>
+            </a:pPr>
+            <a:r>
+              <a:rPr lang="en-US" sz="3200" dirty="0"/>
+              <a:t> </a:t>
+            </a:r>
+            <a:r>
+              <a:rPr lang="en-US" sz="3200" dirty="0" smtClean="0"/>
+              <a:t>Exception Handling</a:t>
             </a:r>
             <a:endParaRPr lang="en-US" sz="3200" dirty="0" smtClean="0"/>
           </a:p>
@@ -6312,13 +6360,18 @@
             <p:ph type="sldNum" sz="quarter" idx="12"/>
           </p:nvPr>
         </p:nvSpPr>
-        <p:spPr/>
+        <p:spPr>
+          <a:xfrm>
+            <a:off x="10212947" y="5878848"/>
+            <a:ext cx="696530" cy="238617"/>
+          </a:xfrm>
+        </p:spPr>
         <p:txBody>
           <a:bodyPr/>
           <a:lstStyle/>
           <a:p>
             <a:fld id="{5D84065D-F351-4B03-BD91-D8A6B8D4B362}" type="slidenum">
-              <a:rPr lang="en-US" sz="2400" smtClean="0"/>
+              <a:rPr lang="en-US" sz="3600" smtClean="0"/>
               <a:t>10</a:t>
             </a:fld>
             <a:endParaRPr lang="en-US" dirty="0"/>
@@ -6378,6 +6431,579 @@
           <a:lstStyle/>
           <a:p>
             <a:r>
+              <a:rPr lang="en-SG" b="1" dirty="0" smtClean="0"/>
+              <a:t>EXAMPLE – EDGE DETECTION</a:t>
+            </a:r>
+            <a:endParaRPr lang="en-SG" b="1" dirty="0"/>
+          </a:p>
+        </p:txBody>
+      </p:sp>
+      <p:pic>
+        <p:nvPicPr>
+          <p:cNvPr id="5" name="Content Placeholder 4"/>
+          <p:cNvPicPr>
+            <a:picLocks noGrp="1" noChangeAspect="1"/>
+          </p:cNvPicPr>
+          <p:nvPr>
+            <p:ph idx="1"/>
+          </p:nvPr>
+        </p:nvPicPr>
+        <p:blipFill>
+          <a:blip r:embed="rId2">
+            <a:extLst>
+              <a:ext uri="{28A0092B-C50C-407E-A947-70E740481C1C}">
+                <a14:useLocalDpi xmlns:a14="http://schemas.microsoft.com/office/drawing/2010/main" val="0"/>
+              </a:ext>
+            </a:extLst>
+          </a:blip>
+          <a:stretch>
+            <a:fillRect/>
+          </a:stretch>
+        </p:blipFill>
+        <p:spPr>
+          <a:xfrm>
+            <a:off x="2932985" y="2531706"/>
+            <a:ext cx="6351787" cy="3317875"/>
+          </a:xfrm>
+        </p:spPr>
+      </p:pic>
+      <p:sp>
+        <p:nvSpPr>
+          <p:cNvPr id="4" name="Slide Number Placeholder 3"/>
+          <p:cNvSpPr>
+            <a:spLocks noGrp="1"/>
+          </p:cNvSpPr>
+          <p:nvPr>
+            <p:ph type="sldNum" sz="quarter" idx="12"/>
+          </p:nvPr>
+        </p:nvSpPr>
+        <p:spPr>
+          <a:xfrm>
+            <a:off x="10353901" y="5911403"/>
+            <a:ext cx="747688" cy="336997"/>
+          </a:xfrm>
+        </p:spPr>
+        <p:txBody>
+          <a:bodyPr/>
+          <a:lstStyle/>
+          <a:p>
+            <a:fld id="{5D84065D-F351-4B03-BD91-D8A6B8D4B362}" type="slidenum">
+              <a:rPr lang="en-US" sz="3600" smtClean="0"/>
+              <a:t>11</a:t>
+            </a:fld>
+            <a:endParaRPr lang="en-US" dirty="0"/>
+          </a:p>
+        </p:txBody>
+      </p:sp>
+    </p:spTree>
+    <p:extLst>
+      <p:ext uri="{BB962C8B-B14F-4D97-AF65-F5344CB8AC3E}">
+        <p14:creationId xmlns:p14="http://schemas.microsoft.com/office/powerpoint/2010/main" val="253731516"/>
+      </p:ext>
+    </p:extLst>
+  </p:cSld>
+  <p:clrMapOvr>
+    <a:masterClrMapping/>
+  </p:clrMapOvr>
+  <p:timing>
+    <p:tnLst>
+      <p:par>
+        <p:cTn id="1" dur="indefinite" restart="never" nodeType="tmRoot">
+          <p:childTnLst>
+            <p:seq concurrent="1" nextAc="seek">
+              <p:cTn id="2" dur="indefinite" nodeType="mainSeq">
+                <p:childTnLst>
+                  <p:par>
+                    <p:cTn id="3" fill="hold">
+                      <p:stCondLst>
+                        <p:cond delay="indefinite"/>
+                      </p:stCondLst>
+                      <p:childTnLst>
+                        <p:par>
+                          <p:cTn id="4" fill="hold">
+                            <p:stCondLst>
+                              <p:cond delay="0"/>
+                            </p:stCondLst>
+                            <p:childTnLst>
+                              <p:par>
+                                <p:cTn id="5" presetID="16" presetClass="entr" presetSubtype="21" fill="hold" nodeType="clickEffect">
+                                  <p:stCondLst>
+                                    <p:cond delay="0"/>
+                                  </p:stCondLst>
+                                  <p:childTnLst>
+                                    <p:set>
+                                      <p:cBhvr>
+                                        <p:cTn id="6" dur="1" fill="hold">
+                                          <p:stCondLst>
+                                            <p:cond delay="0"/>
+                                          </p:stCondLst>
+                                        </p:cTn>
+                                        <p:tgtEl>
+                                          <p:spTgt spid="5"/>
+                                        </p:tgtEl>
+                                        <p:attrNameLst>
+                                          <p:attrName>style.visibility</p:attrName>
+                                        </p:attrNameLst>
+                                      </p:cBhvr>
+                                      <p:to>
+                                        <p:strVal val="visible"/>
+                                      </p:to>
+                                    </p:set>
+                                    <p:animEffect transition="in" filter="barn(inVertical)">
+                                      <p:cBhvr>
+                                        <p:cTn id="7" dur="500"/>
+                                        <p:tgtEl>
+                                          <p:spTgt spid="5"/>
+                                        </p:tgtEl>
+                                      </p:cBhvr>
+                                    </p:animEffect>
+                                  </p:childTnLst>
+                                </p:cTn>
+                              </p:par>
+                            </p:childTnLst>
+                          </p:cTn>
+                        </p:par>
+                      </p:childTnLst>
+                    </p:cTn>
+                  </p:par>
+                </p:childTnLst>
+              </p:cTn>
+              <p:prevCondLst>
+                <p:cond evt="onPrev" delay="0">
+                  <p:tgtEl>
+                    <p:sldTgt/>
+                  </p:tgtEl>
+                </p:cond>
+              </p:prevCondLst>
+              <p:nextCondLst>
+                <p:cond evt="onNext" delay="0">
+                  <p:tgtEl>
+                    <p:sldTgt/>
+                  </p:tgtEl>
+                </p:cond>
+              </p:nextCondLst>
+            </p:seq>
+          </p:childTnLst>
+        </p:cTn>
+      </p:par>
+    </p:tnLst>
+  </p:timing>
+</p:sld>
+</file>
+
+<file path=ppt/slides/slide12.xml><?xml version="1.0" encoding="utf-8"?>
+<p:sld xmlns:a="http://schemas.openxmlformats.org/drawingml/2006/main" xmlns:r="http://schemas.openxmlformats.org/officeDocument/2006/relationships" xmlns:p="http://schemas.openxmlformats.org/presentationml/2006/main">
+  <p:cSld>
+    <p:spTree>
+      <p:nvGrpSpPr>
+        <p:cNvPr id="1" name=""/>
+        <p:cNvGrpSpPr/>
+        <p:nvPr/>
+      </p:nvGrpSpPr>
+      <p:grpSpPr>
+        <a:xfrm>
+          <a:off x="0" y="0"/>
+          <a:ext cx="0" cy="0"/>
+          <a:chOff x="0" y="0"/>
+          <a:chExt cx="0" cy="0"/>
+        </a:xfrm>
+      </p:grpSpPr>
+      <p:sp>
+        <p:nvSpPr>
+          <p:cNvPr id="2" name="Title 1"/>
+          <p:cNvSpPr>
+            <a:spLocks noGrp="1"/>
+          </p:cNvSpPr>
+          <p:nvPr>
+            <p:ph type="title"/>
+          </p:nvPr>
+        </p:nvSpPr>
+        <p:spPr/>
+        <p:txBody>
+          <a:bodyPr/>
+          <a:lstStyle/>
+          <a:p>
+            <a:r>
+              <a:rPr lang="en-SG" b="1" dirty="0" smtClean="0"/>
+              <a:t>EXAMPLE - SMOOTHING</a:t>
+            </a:r>
+            <a:endParaRPr lang="en-SG" b="1" dirty="0"/>
+          </a:p>
+        </p:txBody>
+      </p:sp>
+      <p:pic>
+        <p:nvPicPr>
+          <p:cNvPr id="5" name="Content Placeholder 4"/>
+          <p:cNvPicPr>
+            <a:picLocks noGrp="1" noChangeAspect="1"/>
+          </p:cNvPicPr>
+          <p:nvPr>
+            <p:ph idx="1"/>
+          </p:nvPr>
+        </p:nvPicPr>
+        <p:blipFill rotWithShape="1">
+          <a:blip r:embed="rId2">
+            <a:extLst>
+              <a:ext uri="{28A0092B-C50C-407E-A947-70E740481C1C}">
+                <a14:useLocalDpi xmlns:a14="http://schemas.microsoft.com/office/drawing/2010/main" val="0"/>
+              </a:ext>
+            </a:extLst>
+          </a:blip>
+          <a:srcRect l="5314" t="25121" r="4635" b="15216"/>
+          <a:stretch/>
+        </p:blipFill>
+        <p:spPr>
+          <a:xfrm>
+            <a:off x="2923504" y="2588654"/>
+            <a:ext cx="6074080" cy="2987897"/>
+          </a:xfrm>
+        </p:spPr>
+      </p:pic>
+      <p:sp>
+        <p:nvSpPr>
+          <p:cNvPr id="4" name="Slide Number Placeholder 3"/>
+          <p:cNvSpPr>
+            <a:spLocks noGrp="1"/>
+          </p:cNvSpPr>
+          <p:nvPr>
+            <p:ph type="sldNum" sz="quarter" idx="12"/>
+          </p:nvPr>
+        </p:nvSpPr>
+        <p:spPr>
+          <a:xfrm>
+            <a:off x="10353901" y="5969000"/>
+            <a:ext cx="709051" cy="251496"/>
+          </a:xfrm>
+        </p:spPr>
+        <p:txBody>
+          <a:bodyPr/>
+          <a:lstStyle/>
+          <a:p>
+            <a:fld id="{5D84065D-F351-4B03-BD91-D8A6B8D4B362}" type="slidenum">
+              <a:rPr lang="en-US" sz="3600" smtClean="0"/>
+              <a:t>12</a:t>
+            </a:fld>
+            <a:endParaRPr lang="en-US" sz="3600" dirty="0"/>
+          </a:p>
+        </p:txBody>
+      </p:sp>
+    </p:spTree>
+    <p:extLst>
+      <p:ext uri="{BB962C8B-B14F-4D97-AF65-F5344CB8AC3E}">
+        <p14:creationId xmlns:p14="http://schemas.microsoft.com/office/powerpoint/2010/main" val="3221358286"/>
+      </p:ext>
+    </p:extLst>
+  </p:cSld>
+  <p:clrMapOvr>
+    <a:masterClrMapping/>
+  </p:clrMapOvr>
+  <p:timing>
+    <p:tnLst>
+      <p:par>
+        <p:cTn id="1" dur="indefinite" restart="never" nodeType="tmRoot">
+          <p:childTnLst>
+            <p:seq concurrent="1" nextAc="seek">
+              <p:cTn id="2" dur="indefinite" nodeType="mainSeq">
+                <p:childTnLst>
+                  <p:par>
+                    <p:cTn id="3" fill="hold">
+                      <p:stCondLst>
+                        <p:cond delay="indefinite"/>
+                      </p:stCondLst>
+                      <p:childTnLst>
+                        <p:par>
+                          <p:cTn id="4" fill="hold">
+                            <p:stCondLst>
+                              <p:cond delay="0"/>
+                            </p:stCondLst>
+                            <p:childTnLst>
+                              <p:par>
+                                <p:cTn id="5" presetID="22" presetClass="entr" presetSubtype="4" fill="hold" nodeType="clickEffect">
+                                  <p:stCondLst>
+                                    <p:cond delay="0"/>
+                                  </p:stCondLst>
+                                  <p:childTnLst>
+                                    <p:set>
+                                      <p:cBhvr>
+                                        <p:cTn id="6" dur="1" fill="hold">
+                                          <p:stCondLst>
+                                            <p:cond delay="0"/>
+                                          </p:stCondLst>
+                                        </p:cTn>
+                                        <p:tgtEl>
+                                          <p:spTgt spid="5"/>
+                                        </p:tgtEl>
+                                        <p:attrNameLst>
+                                          <p:attrName>style.visibility</p:attrName>
+                                        </p:attrNameLst>
+                                      </p:cBhvr>
+                                      <p:to>
+                                        <p:strVal val="visible"/>
+                                      </p:to>
+                                    </p:set>
+                                    <p:animEffect transition="in" filter="wipe(down)">
+                                      <p:cBhvr>
+                                        <p:cTn id="7" dur="500"/>
+                                        <p:tgtEl>
+                                          <p:spTgt spid="5"/>
+                                        </p:tgtEl>
+                                      </p:cBhvr>
+                                    </p:animEffect>
+                                  </p:childTnLst>
+                                </p:cTn>
+                              </p:par>
+                            </p:childTnLst>
+                          </p:cTn>
+                        </p:par>
+                      </p:childTnLst>
+                    </p:cTn>
+                  </p:par>
+                </p:childTnLst>
+              </p:cTn>
+              <p:prevCondLst>
+                <p:cond evt="onPrev" delay="0">
+                  <p:tgtEl>
+                    <p:sldTgt/>
+                  </p:tgtEl>
+                </p:cond>
+              </p:prevCondLst>
+              <p:nextCondLst>
+                <p:cond evt="onNext" delay="0">
+                  <p:tgtEl>
+                    <p:sldTgt/>
+                  </p:tgtEl>
+                </p:cond>
+              </p:nextCondLst>
+            </p:seq>
+          </p:childTnLst>
+        </p:cTn>
+      </p:par>
+    </p:tnLst>
+  </p:timing>
+</p:sld>
+</file>
+
+<file path=ppt/slides/slide13.xml><?xml version="1.0" encoding="utf-8"?>
+<p:sld xmlns:a="http://schemas.openxmlformats.org/drawingml/2006/main" xmlns:r="http://schemas.openxmlformats.org/officeDocument/2006/relationships" xmlns:p="http://schemas.openxmlformats.org/presentationml/2006/main">
+  <p:cSld>
+    <p:spTree>
+      <p:nvGrpSpPr>
+        <p:cNvPr id="1" name=""/>
+        <p:cNvGrpSpPr/>
+        <p:nvPr/>
+      </p:nvGrpSpPr>
+      <p:grpSpPr>
+        <a:xfrm>
+          <a:off x="0" y="0"/>
+          <a:ext cx="0" cy="0"/>
+          <a:chOff x="0" y="0"/>
+          <a:chExt cx="0" cy="0"/>
+        </a:xfrm>
+      </p:grpSpPr>
+      <p:sp>
+        <p:nvSpPr>
+          <p:cNvPr id="2" name="Title 1"/>
+          <p:cNvSpPr>
+            <a:spLocks noGrp="1"/>
+          </p:cNvSpPr>
+          <p:nvPr>
+            <p:ph type="title"/>
+          </p:nvPr>
+        </p:nvSpPr>
+        <p:spPr/>
+        <p:txBody>
+          <a:bodyPr/>
+          <a:lstStyle/>
+          <a:p>
+            <a:r>
+              <a:rPr lang="en-SG" b="1" dirty="0" smtClean="0"/>
+              <a:t>EXAMPLE – MEDIAN FILTER</a:t>
+            </a:r>
+            <a:endParaRPr lang="en-SG" b="1" dirty="0"/>
+          </a:p>
+        </p:txBody>
+      </p:sp>
+      <p:pic>
+        <p:nvPicPr>
+          <p:cNvPr id="5" name="Content Placeholder 4"/>
+          <p:cNvPicPr>
+            <a:picLocks noGrp="1" noChangeAspect="1"/>
+          </p:cNvPicPr>
+          <p:nvPr>
+            <p:ph idx="1"/>
+          </p:nvPr>
+        </p:nvPicPr>
+        <p:blipFill>
+          <a:blip r:embed="rId2">
+            <a:extLst>
+              <a:ext uri="{28A0092B-C50C-407E-A947-70E740481C1C}">
+                <a14:useLocalDpi xmlns:a14="http://schemas.microsoft.com/office/drawing/2010/main" val="0"/>
+              </a:ext>
+            </a:extLst>
+          </a:blip>
+          <a:stretch>
+            <a:fillRect/>
+          </a:stretch>
+        </p:blipFill>
+        <p:spPr>
+          <a:xfrm>
+            <a:off x="2989905" y="2588654"/>
+            <a:ext cx="6064939" cy="2820473"/>
+          </a:xfrm>
+        </p:spPr>
+      </p:pic>
+      <p:sp>
+        <p:nvSpPr>
+          <p:cNvPr id="4" name="Slide Number Placeholder 3"/>
+          <p:cNvSpPr>
+            <a:spLocks noGrp="1"/>
+          </p:cNvSpPr>
+          <p:nvPr>
+            <p:ph type="sldNum" sz="quarter" idx="12"/>
+          </p:nvPr>
+        </p:nvSpPr>
+        <p:spPr/>
+        <p:txBody>
+          <a:bodyPr/>
+          <a:lstStyle/>
+          <a:p>
+            <a:fld id="{5D84065D-F351-4B03-BD91-D8A6B8D4B362}" type="slidenum">
+              <a:rPr lang="en-US" smtClean="0"/>
+              <a:t>13</a:t>
+            </a:fld>
+            <a:endParaRPr lang="en-US" dirty="0"/>
+          </a:p>
+        </p:txBody>
+      </p:sp>
+    </p:spTree>
+    <p:extLst>
+      <p:ext uri="{BB962C8B-B14F-4D97-AF65-F5344CB8AC3E}">
+        <p14:creationId xmlns:p14="http://schemas.microsoft.com/office/powerpoint/2010/main" val="2484374056"/>
+      </p:ext>
+    </p:extLst>
+  </p:cSld>
+  <p:clrMapOvr>
+    <a:masterClrMapping/>
+  </p:clrMapOvr>
+  <p:timing>
+    <p:tnLst>
+      <p:par>
+        <p:cTn id="1" dur="indefinite" restart="never" nodeType="tmRoot">
+          <p:childTnLst>
+            <p:seq concurrent="1" nextAc="seek">
+              <p:cTn id="2" dur="indefinite" nodeType="mainSeq">
+                <p:childTnLst>
+                  <p:par>
+                    <p:cTn id="3" fill="hold">
+                      <p:stCondLst>
+                        <p:cond delay="indefinite"/>
+                      </p:stCondLst>
+                      <p:childTnLst>
+                        <p:par>
+                          <p:cTn id="4" fill="hold">
+                            <p:stCondLst>
+                              <p:cond delay="0"/>
+                            </p:stCondLst>
+                            <p:childTnLst>
+                              <p:par>
+                                <p:cTn id="5" presetID="22" presetClass="entr" presetSubtype="4" fill="hold" nodeType="clickEffect">
+                                  <p:stCondLst>
+                                    <p:cond delay="0"/>
+                                  </p:stCondLst>
+                                  <p:childTnLst>
+                                    <p:set>
+                                      <p:cBhvr>
+                                        <p:cTn id="6" dur="1" fill="hold">
+                                          <p:stCondLst>
+                                            <p:cond delay="0"/>
+                                          </p:stCondLst>
+                                        </p:cTn>
+                                        <p:tgtEl>
+                                          <p:spTgt spid="5"/>
+                                        </p:tgtEl>
+                                        <p:attrNameLst>
+                                          <p:attrName>style.visibility</p:attrName>
+                                        </p:attrNameLst>
+                                      </p:cBhvr>
+                                      <p:to>
+                                        <p:strVal val="visible"/>
+                                      </p:to>
+                                    </p:set>
+                                    <p:animEffect transition="in" filter="wipe(down)">
+                                      <p:cBhvr>
+                                        <p:cTn id="7" dur="500"/>
+                                        <p:tgtEl>
+                                          <p:spTgt spid="5"/>
+                                        </p:tgtEl>
+                                      </p:cBhvr>
+                                    </p:animEffect>
+                                  </p:childTnLst>
+                                </p:cTn>
+                              </p:par>
+                            </p:childTnLst>
+                          </p:cTn>
+                        </p:par>
+                      </p:childTnLst>
+                    </p:cTn>
+                  </p:par>
+                </p:childTnLst>
+              </p:cTn>
+              <p:prevCondLst>
+                <p:cond evt="onPrev" delay="0">
+                  <p:tgtEl>
+                    <p:sldTgt/>
+                  </p:tgtEl>
+                </p:cond>
+              </p:prevCondLst>
+              <p:nextCondLst>
+                <p:cond evt="onNext" delay="0">
+                  <p:tgtEl>
+                    <p:sldTgt/>
+                  </p:tgtEl>
+                </p:cond>
+              </p:nextCondLst>
+            </p:seq>
+          </p:childTnLst>
+        </p:cTn>
+      </p:par>
+    </p:tnLst>
+  </p:timing>
+</p:sld>
+</file>
+
+<file path=ppt/slides/slide14.xml><?xml version="1.0" encoding="utf-8"?>
+<p:sld xmlns:a="http://schemas.openxmlformats.org/drawingml/2006/main" xmlns:r="http://schemas.openxmlformats.org/officeDocument/2006/relationships" xmlns:p="http://schemas.openxmlformats.org/presentationml/2006/main">
+  <p:cSld>
+    <p:spTree>
+      <p:nvGrpSpPr>
+        <p:cNvPr id="1" name=""/>
+        <p:cNvGrpSpPr/>
+        <p:nvPr/>
+      </p:nvGrpSpPr>
+      <p:grpSpPr>
+        <a:xfrm>
+          <a:off x="0" y="0"/>
+          <a:ext cx="0" cy="0"/>
+          <a:chOff x="0" y="0"/>
+          <a:chExt cx="0" cy="0"/>
+        </a:xfrm>
+      </p:grpSpPr>
+      <p:sp>
+        <p:nvSpPr>
+          <p:cNvPr id="2" name="Title 1"/>
+          <p:cNvSpPr>
+            <a:spLocks noGrp="1"/>
+          </p:cNvSpPr>
+          <p:nvPr>
+            <p:ph type="title"/>
+          </p:nvPr>
+        </p:nvSpPr>
+        <p:spPr/>
+        <p:txBody>
+          <a:bodyPr/>
+          <a:lstStyle/>
+          <a:p>
+            <a:r>
               <a:rPr lang="en-US" b="1" dirty="0" smtClean="0"/>
               <a:t>REFERENCE LINKS</a:t>
             </a:r>
@@ -6398,7 +7024,7 @@
         <p:spPr/>
         <p:txBody>
           <a:bodyPr>
-            <a:normAutofit/>
+            <a:normAutofit fontScale="85000" lnSpcReduction="20000"/>
           </a:bodyPr>
           <a:lstStyle/>
           <a:p>
@@ -6424,13 +7050,44 @@
               <a:rPr lang="en-US" dirty="0" smtClean="0">
                 <a:hlinkClick r:id="rId4"/>
               </a:rPr>
-              <a:t>http://homepages.inf.ed.ac.uk/rbf/BOOKS/PHILLIPS/cips2ed.pdf</a:t>
+              <a:t>http://</a:t>
+            </a:r>
+            <a:r>
+              <a:rPr lang="en-US" dirty="0" smtClean="0">
+                <a:hlinkClick r:id="rId4"/>
+              </a:rPr>
+              <a:t>homepages.inf.ed.ac.uk/rbf/BOOKS/PHILLIPS/cips2ed.pdf</a:t>
             </a:r>
             <a:endParaRPr lang="en-US" dirty="0" smtClean="0"/>
           </a:p>
           <a:p>
+            <a:r>
+              <a:rPr lang="en-US" dirty="0">
+                <a:hlinkClick r:id="rId5"/>
+              </a:rPr>
+              <a:t>https://</a:t>
+            </a:r>
+            <a:r>
+              <a:rPr lang="en-US" dirty="0" smtClean="0">
+                <a:hlinkClick r:id="rId5"/>
+              </a:rPr>
+              <a:t>image.slidesharecdn.com/smoothing-180424114019/95/smoothing-in-digital-image-processing-11-638.jpg?cb=1524570146</a:t>
+            </a:r>
             <a:endParaRPr lang="en-US" dirty="0" smtClean="0"/>
           </a:p>
+          <a:p>
+            <a:r>
+              <a:rPr lang="en-US" dirty="0"/>
+              <a:t>https://www.researchgate.net/profile/Josin_Hippolitus/publication/311770756/figure/fig2/AS:468112656080898@1488618162979/left-original-image-right-image-after-edge-detection.png</a:t>
+            </a:r>
+            <a:endParaRPr lang="en-US" dirty="0" smtClean="0"/>
+          </a:p>
+          <a:p>
+            <a:endParaRPr lang="en-US" dirty="0" smtClean="0"/>
+          </a:p>
+          <a:p>
+            <a:endParaRPr lang="en-US" dirty="0" smtClean="0"/>
+          </a:p>
         </p:txBody>
       </p:sp>
       <p:sp>
@@ -6443,14 +7100,19 @@
             <p:ph type="sldNum" sz="quarter" idx="12"/>
           </p:nvPr>
         </p:nvSpPr>
-        <p:spPr/>
+        <p:spPr>
+          <a:xfrm>
+            <a:off x="10353901" y="5950039"/>
+            <a:ext cx="734809" cy="298361"/>
+          </a:xfrm>
+        </p:spPr>
         <p:txBody>
           <a:bodyPr/>
           <a:lstStyle/>
           <a:p>
             <a:fld id="{5D84065D-F351-4B03-BD91-D8A6B8D4B362}" type="slidenum">
-              <a:rPr lang="en-US" sz="2400" smtClean="0"/>
-              <a:t>11</a:t>
+              <a:rPr lang="en-US" sz="3600" smtClean="0"/>
+              <a:t>14</a:t>
             </a:fld>
             <a:endParaRPr lang="en-US" dirty="0"/>
           </a:p>
@@ -6505,13 +7167,13 @@
         </p:nvSpPr>
         <p:spPr>
           <a:xfrm>
-            <a:off x="1115098" y="299551"/>
+            <a:off x="1166614" y="801827"/>
             <a:ext cx="9601196" cy="4916393"/>
           </a:xfrm>
         </p:spPr>
         <p:txBody>
           <a:bodyPr>
-            <a:normAutofit/>
+            <a:normAutofit fontScale="90000"/>
           </a:bodyPr>
           <a:lstStyle/>
           <a:p>
@@ -6549,7 +7211,44 @@
             </a:br>
             <a:r>
               <a:rPr lang="en-US" b="1" dirty="0" smtClean="0"/>
-              <a:t>C, C++</a:t>
+              <a:t>C/ </a:t>
+            </a:r>
+            <a:r>
+              <a:rPr lang="en-US" b="1" dirty="0" smtClean="0"/>
+              <a:t>C</a:t>
+            </a:r>
+            <a:r>
+              <a:rPr lang="en-US" b="1" dirty="0" smtClean="0"/>
+              <a:t>++</a:t>
+            </a:r>
+            <a:br>
+              <a:rPr lang="en-US" b="1" dirty="0" smtClean="0"/>
+            </a:br>
+            <a:r>
+              <a:rPr lang="en-US" b="1" dirty="0"/>
+              <a:t/>
+            </a:r>
+            <a:br>
+              <a:rPr lang="en-US" b="1" dirty="0"/>
+            </a:br>
+            <a:r>
+              <a:rPr lang="en-US" sz="4000" dirty="0" smtClean="0"/>
+              <a:t>GITHUB </a:t>
+            </a:r>
+            <a:r>
+              <a:rPr lang="en-US" sz="4000" dirty="0"/>
+              <a:t>LINK:</a:t>
+            </a:r>
+            <a:r>
+              <a:rPr lang="en-US" dirty="0"/>
+              <a:t/>
+            </a:r>
+            <a:br>
+              <a:rPr lang="en-US" dirty="0"/>
+            </a:br>
+            <a:r>
+              <a:rPr lang="en-US" b="1" dirty="0"/>
+              <a:t>https://github.com/jsureka/SPL1</a:t>
             </a:r>
             <a:endParaRPr lang="en-US" b="1" dirty="0"/>
           </a:p>
@@ -6565,13 +7264,18 @@
             <p:ph type="sldNum" sz="quarter" idx="12"/>
           </p:nvPr>
         </p:nvSpPr>
-        <p:spPr/>
+        <p:spPr>
+          <a:xfrm>
+            <a:off x="10366780" y="5891727"/>
+            <a:ext cx="542697" cy="279400"/>
+          </a:xfrm>
+        </p:spPr>
         <p:txBody>
           <a:bodyPr/>
           <a:lstStyle/>
           <a:p>
             <a:fld id="{5D84065D-F351-4B03-BD91-D8A6B8D4B362}" type="slidenum">
-              <a:rPr lang="en-US" sz="2800" smtClean="0"/>
+              <a:rPr lang="en-US" sz="3600" smtClean="0"/>
               <a:t>2</a:t>
             </a:fld>
             <a:endParaRPr lang="en-US" sz="2800" dirty="0"/>
@@ -6588,6 +7292,92 @@
   <p:clrMapOvr>
     <a:masterClrMapping/>
   </p:clrMapOvr>
+  <p:timing>
+    <p:tnLst>
+      <p:par>
+        <p:cTn id="1" dur="indefinite" restart="never" nodeType="tmRoot">
+          <p:childTnLst>
+            <p:seq concurrent="1" nextAc="seek">
+              <p:cTn id="2" dur="indefinite" nodeType="mainSeq">
+                <p:childTnLst>
+                  <p:par>
+                    <p:cTn id="3" fill="hold">
+                      <p:stCondLst>
+                        <p:cond delay="indefinite"/>
+                      </p:stCondLst>
+                      <p:childTnLst>
+                        <p:par>
+                          <p:cTn id="4" fill="hold">
+                            <p:stCondLst>
+                              <p:cond delay="0"/>
+                            </p:stCondLst>
+                            <p:childTnLst>
+                              <p:par>
+                                <p:cTn id="5" presetID="10" presetClass="entr" presetSubtype="0" fill="hold" grpId="0" nodeType="clickEffect">
+                                  <p:stCondLst>
+                                    <p:cond delay="0"/>
+                                  </p:stCondLst>
+                                  <p:childTnLst>
+                                    <p:set>
+                                      <p:cBhvr>
+                                        <p:cTn id="6" dur="1" fill="hold">
+                                          <p:stCondLst>
+                                            <p:cond delay="0"/>
+                                          </p:stCondLst>
+                                        </p:cTn>
+                                        <p:tgtEl>
+                                          <p:spTgt spid="2"/>
+                                        </p:tgtEl>
+                                        <p:attrNameLst>
+                                          <p:attrName>style.visibility</p:attrName>
+                                        </p:attrNameLst>
+                                      </p:cBhvr>
+                                      <p:to>
+                                        <p:strVal val="visible"/>
+                                      </p:to>
+                                    </p:set>
+                                    <p:animEffect transition="in" filter="fade">
+                                      <p:cBhvr>
+                                        <p:cTn id="7" dur="500"/>
+                                        <p:tgtEl>
+                                          <p:spTgt spid="2"/>
+                                        </p:tgtEl>
+                                      </p:cBhvr>
+                                    </p:animEffect>
+                                  </p:childTnLst>
+                                </p:cTn>
+                              </p:par>
+                            </p:childTnLst>
+                          </p:cTn>
+                        </p:par>
+                      </p:childTnLst>
+                    </p:cTn>
+                  </p:par>
+                </p:childTnLst>
+              </p:cTn>
+              <p:prevCondLst>
+                <p:cond evt="onPrev" delay="0">
+                  <p:tgtEl>
+                    <p:sldTgt/>
+                  </p:tgtEl>
+                </p:cond>
+              </p:prevCondLst>
+              <p:nextCondLst>
+                <p:cond evt="onNext" delay="0">
+                  <p:tgtEl>
+                    <p:sldTgt/>
+                  </p:tgtEl>
+                </p:cond>
+              </p:nextCondLst>
+            </p:seq>
+          </p:childTnLst>
+        </p:cTn>
+      </p:par>
+    </p:tnLst>
+    <p:bldLst>
+      <p:bldP spid="2" grpId="0"/>
+    </p:bldLst>
+  </p:timing>
 </p:sld>
 </file>
 
@@ -6667,16 +7457,16 @@
               <a:t>Wanted to explore the image </a:t>
             </a:r>
             <a:r>
-              <a:rPr lang="en-US" sz="3200" dirty="0" err="1" smtClean="0">
-                <a:latin typeface="Arial Narrow" panose="020B0606020202030204" pitchFamily="34" charset="0"/>
-              </a:rPr>
-              <a:t>manupulation</a:t>
-            </a:r>
-            <a:r>
               <a:rPr lang="en-US" sz="3200" dirty="0" smtClean="0">
                 <a:latin typeface="Arial Narrow" panose="020B0606020202030204" pitchFamily="34" charset="0"/>
               </a:rPr>
-              <a:t> side of the technology field</a:t>
+              <a:t>manipulation </a:t>
+            </a:r>
+            <a:r>
+              <a:rPr lang="en-US" sz="3200" dirty="0" smtClean="0">
+                <a:latin typeface="Arial Narrow" panose="020B0606020202030204" pitchFamily="34" charset="0"/>
+              </a:rPr>
+              <a:t>side of the technology field</a:t>
             </a:r>
           </a:p>
           <a:p>
@@ -6701,10 +7491,10 @@
               <a:t> Want to work on a bigger project which will require rigorous work on image </a:t>
             </a:r>
             <a:r>
-              <a:rPr lang="en-US" sz="3200" dirty="0" err="1" smtClean="0">
+              <a:rPr lang="en-US" sz="3200" dirty="0" smtClean="0">
                 <a:latin typeface="Arial Narrow" panose="020B0606020202030204" pitchFamily="34" charset="0"/>
               </a:rPr>
-              <a:t>manupulation</a:t>
+              <a:t>manipulation</a:t>
             </a:r>
             <a:endParaRPr lang="en-US" sz="3200" dirty="0">
               <a:latin typeface="Arial Narrow" panose="020B0606020202030204" pitchFamily="34" charset="0"/>
@@ -6722,13 +7512,18 @@
             <p:ph type="sldNum" sz="quarter" idx="12"/>
           </p:nvPr>
         </p:nvSpPr>
-        <p:spPr/>
+        <p:spPr>
+          <a:xfrm>
+            <a:off x="10379658" y="5878847"/>
+            <a:ext cx="542697" cy="279400"/>
+          </a:xfrm>
+        </p:spPr>
         <p:txBody>
           <a:bodyPr/>
           <a:lstStyle/>
           <a:p>
             <a:fld id="{5D84065D-F351-4B03-BD91-D8A6B8D4B362}" type="slidenum">
-              <a:rPr lang="en-US" sz="2800" smtClean="0"/>
+              <a:rPr lang="en-US" sz="3600" smtClean="0"/>
               <a:t>3</a:t>
             </a:fld>
             <a:endParaRPr lang="en-US" dirty="0"/>
@@ -6812,7 +7607,7 @@
         </p:nvSpPr>
         <p:spPr>
           <a:xfrm>
-            <a:off x="1295402" y="2357308"/>
+            <a:off x="1334039" y="2318671"/>
             <a:ext cx="9601196" cy="3318936"/>
           </a:xfrm>
         </p:spPr>
@@ -6852,14 +7647,7 @@
                 <a:latin typeface="Calibri" panose="020F0502020204030204" pitchFamily="34" charset="0"/>
                 <a:cs typeface="Calibri" panose="020F0502020204030204" pitchFamily="34" charset="0"/>
               </a:rPr>
-              <a:t>Menu </a:t>
-            </a:r>
-            <a:r>
-              <a:rPr lang="en-US" dirty="0" smtClean="0">
-                <a:latin typeface="Calibri" panose="020F0502020204030204" pitchFamily="34" charset="0"/>
-                <a:cs typeface="Calibri" panose="020F0502020204030204" pitchFamily="34" charset="0"/>
-              </a:rPr>
-              <a:t>containing a number of image processing tools</a:t>
+              <a:t>Menu containing a number of image processing tools</a:t>
             </a:r>
           </a:p>
           <a:p>
@@ -6873,14 +7661,7 @@
                 <a:latin typeface="Calibri" panose="020F0502020204030204" pitchFamily="34" charset="0"/>
                 <a:cs typeface="Calibri" panose="020F0502020204030204" pitchFamily="34" charset="0"/>
               </a:rPr>
-              <a:t>Increment </a:t>
-            </a:r>
-            <a:r>
-              <a:rPr lang="en-US" dirty="0" smtClean="0">
-                <a:latin typeface="Calibri" panose="020F0502020204030204" pitchFamily="34" charset="0"/>
-                <a:cs typeface="Calibri" panose="020F0502020204030204" pitchFamily="34" charset="0"/>
-              </a:rPr>
-              <a:t>or decrement options will be given for each image modification tool</a:t>
+              <a:t>Increment or decrement options will be given for each image modification tool</a:t>
             </a:r>
           </a:p>
           <a:p>
@@ -6908,8 +7689,19 @@
                 <a:latin typeface="Calibri" panose="020F0502020204030204" pitchFamily="34" charset="0"/>
                 <a:cs typeface="Calibri" panose="020F0502020204030204" pitchFamily="34" charset="0"/>
               </a:rPr>
-              <a:t>Primarily, the project will focus on the following image processing tools</a:t>
-            </a:r>
+              <a:t>Primarily, the project will focus on </a:t>
+            </a:r>
+            <a:r>
+              <a:rPr lang="en-US" dirty="0" smtClean="0">
+                <a:latin typeface="Calibri" panose="020F0502020204030204" pitchFamily="34" charset="0"/>
+                <a:cs typeface="Calibri" panose="020F0502020204030204" pitchFamily="34" charset="0"/>
+              </a:rPr>
+              <a:t>implementing :</a:t>
+            </a:r>
+            <a:endParaRPr lang="en-US" dirty="0" smtClean="0">
+              <a:latin typeface="Calibri" panose="020F0502020204030204" pitchFamily="34" charset="0"/>
+              <a:cs typeface="Calibri" panose="020F0502020204030204" pitchFamily="34" charset="0"/>
+            </a:endParaRPr>
           </a:p>
           <a:p>
             <a:pPr marL="0" indent="0">
@@ -6928,7 +7720,42 @@
                 <a:latin typeface="Calibri" panose="020F0502020204030204" pitchFamily="34" charset="0"/>
                 <a:cs typeface="Calibri" panose="020F0502020204030204" pitchFamily="34" charset="0"/>
               </a:rPr>
-              <a:t>    Smoothing, brightness control, Sharpening, Gray-Scaling , Edge Detection </a:t>
+              <a:t>    Smoothing, </a:t>
+            </a:r>
+            <a:r>
+              <a:rPr lang="en-US" dirty="0">
+                <a:latin typeface="Calibri" panose="020F0502020204030204" pitchFamily="34" charset="0"/>
+                <a:cs typeface="Calibri" panose="020F0502020204030204" pitchFamily="34" charset="0"/>
+              </a:rPr>
+              <a:t>Z</a:t>
+            </a:r>
+            <a:r>
+              <a:rPr lang="en-US" dirty="0" smtClean="0">
+                <a:latin typeface="Calibri" panose="020F0502020204030204" pitchFamily="34" charset="0"/>
+                <a:cs typeface="Calibri" panose="020F0502020204030204" pitchFamily="34" charset="0"/>
+              </a:rPr>
+              <a:t>ooming, Sharpening</a:t>
+            </a:r>
+            <a:r>
+              <a:rPr lang="en-US" dirty="0" smtClean="0">
+                <a:latin typeface="Calibri" panose="020F0502020204030204" pitchFamily="34" charset="0"/>
+                <a:cs typeface="Calibri" panose="020F0502020204030204" pitchFamily="34" charset="0"/>
+              </a:rPr>
+              <a:t>, </a:t>
+            </a:r>
+            <a:r>
+              <a:rPr lang="en-US" dirty="0" smtClean="0">
+                <a:latin typeface="Calibri" panose="020F0502020204030204" pitchFamily="34" charset="0"/>
+                <a:cs typeface="Calibri" panose="020F0502020204030204" pitchFamily="34" charset="0"/>
+              </a:rPr>
+              <a:t> Gray-Scaling  and Edge </a:t>
+            </a:r>
+            <a:r>
+              <a:rPr lang="en-US" dirty="0" smtClean="0">
+                <a:latin typeface="Calibri" panose="020F0502020204030204" pitchFamily="34" charset="0"/>
+                <a:cs typeface="Calibri" panose="020F0502020204030204" pitchFamily="34" charset="0"/>
+              </a:rPr>
+              <a:t>Detection </a:t>
             </a:r>
           </a:p>
         </p:txBody>
@@ -6943,16 +7770,21 @@
             <p:ph type="sldNum" sz="quarter" idx="12"/>
           </p:nvPr>
         </p:nvSpPr>
-        <p:spPr/>
+        <p:spPr>
+          <a:xfrm>
+            <a:off x="10405417" y="5853090"/>
+            <a:ext cx="542697" cy="279400"/>
+          </a:xfrm>
+        </p:spPr>
         <p:txBody>
           <a:bodyPr/>
           <a:lstStyle/>
           <a:p>
             <a:fld id="{5D84065D-F351-4B03-BD91-D8A6B8D4B362}" type="slidenum">
-              <a:rPr lang="en-US" sz="2400" smtClean="0"/>
+              <a:rPr lang="en-US" sz="3600" smtClean="0"/>
               <a:t>4</a:t>
             </a:fld>
-            <a:endParaRPr lang="en-US" dirty="0"/>
+            <a:endParaRPr lang="en-US" sz="1200" dirty="0"/>
           </a:p>
         </p:txBody>
       </p:sp>
@@ -7054,7 +7886,7 @@
         <p:spPr>
           <a:xfrm>
             <a:off x="746974" y="2427668"/>
-            <a:ext cx="5769735" cy="2123658"/>
+            <a:ext cx="5769735" cy="3416320"/>
           </a:xfrm>
           <a:prstGeom prst="rect">
             <a:avLst/>
@@ -7077,9 +7909,6 @@
               </a:rPr>
               <a:t>Reading the image data</a:t>
             </a:r>
-            <a:endParaRPr lang="en-US" sz="2800" dirty="0" smtClean="0">
-              <a:latin typeface="Imprint MT Shadow" panose="04020605060303030202" pitchFamily="82" charset="0"/>
-            </a:endParaRPr>
           </a:p>
           <a:p>
             <a:pPr marL="342900" indent="-342900">
@@ -7090,8 +7919,56 @@
               <a:rPr lang="en-US" sz="2800" dirty="0" smtClean="0">
                 <a:latin typeface="Imprint MT Shadow" panose="04020605060303030202" pitchFamily="82" charset="0"/>
               </a:rPr>
-              <a:t>Write the header in the output file</a:t>
-            </a:r>
+              <a:t>Write the header in the output </a:t>
+            </a:r>
+            <a:r>
+              <a:rPr lang="en-US" sz="2800" dirty="0" smtClean="0">
+                <a:latin typeface="Imprint MT Shadow" panose="04020605060303030202" pitchFamily="82" charset="0"/>
+              </a:rPr>
+              <a:t>file</a:t>
+            </a:r>
+          </a:p>
+          <a:p>
+            <a:pPr marL="342900" indent="-342900">
+              <a:buFont typeface="Wingdings" panose="05000000000000000000" pitchFamily="2" charset="2"/>
+              <a:buChar char="Ø"/>
+            </a:pPr>
+            <a:r>
+              <a:rPr lang="en-US" sz="2800" dirty="0" smtClean="0">
+                <a:latin typeface="Imprint MT Shadow" panose="04020605060303030202" pitchFamily="82" charset="0"/>
+              </a:rPr>
+              <a:t>Process the pixels as required</a:t>
+            </a:r>
+          </a:p>
+          <a:p>
+            <a:pPr marL="914400" lvl="1" indent="-457200">
+              <a:buFont typeface="Arial" pitchFamily="34" charset="0"/>
+              <a:buChar char="•"/>
+            </a:pPr>
+            <a:r>
+              <a:rPr lang="en-US" sz="2800" dirty="0" err="1" smtClean="0">
+                <a:latin typeface="Imprint MT Shadow" panose="04020605060303030202" pitchFamily="82" charset="0"/>
+              </a:rPr>
+              <a:t>GrayScaling</a:t>
+            </a:r>
+            <a:endParaRPr lang="en-US" sz="2800" dirty="0" smtClean="0">
+              <a:latin typeface="Imprint MT Shadow" panose="04020605060303030202" pitchFamily="82" charset="0"/>
+            </a:endParaRPr>
+          </a:p>
+          <a:p>
+            <a:pPr marL="914400" lvl="1" indent="-457200">
+              <a:buFont typeface="Arial" pitchFamily="34" charset="0"/>
+              <a:buChar char="•"/>
+            </a:pPr>
+            <a:r>
+              <a:rPr lang="en-US" sz="2800" dirty="0" smtClean="0">
+                <a:latin typeface="Imprint MT Shadow" panose="04020605060303030202" pitchFamily="82" charset="0"/>
+              </a:rPr>
+              <a:t>Darkening </a:t>
+            </a:r>
+            <a:endParaRPr lang="en-US" sz="2800" dirty="0" smtClean="0">
+              <a:latin typeface="Imprint MT Shadow" panose="04020605060303030202" pitchFamily="82" charset="0"/>
+            </a:endParaRPr>
           </a:p>
           <a:p>
             <a:pPr marL="342900" indent="-342900">
@@ -7130,10 +8007,10 @@
           <a:lstStyle/>
           <a:p>
             <a:fld id="{5D84065D-F351-4B03-BD91-D8A6B8D4B362}" type="slidenum">
-              <a:rPr lang="en-US" sz="2400" smtClean="0"/>
+              <a:rPr lang="en-US" sz="3600" smtClean="0"/>
               <a:t>5</a:t>
             </a:fld>
-            <a:endParaRPr lang="en-US" dirty="0"/>
+            <a:endParaRPr lang="en-US" sz="1200" dirty="0"/>
           </a:p>
         </p:txBody>
       </p:sp>
@@ -7329,9 +8206,67 @@
           </a:p>
         </p:txBody>
       </p:sp>
+      <p:sp>
+        <p:nvSpPr>
+          <p:cNvPr id="3" name="Slide Number Placeholder 2"/>
+          <p:cNvSpPr>
+            <a:spLocks noGrp="1"/>
+          </p:cNvSpPr>
+          <p:nvPr>
+            <p:ph type="sldNum" sz="quarter" idx="12"/>
+          </p:nvPr>
+        </p:nvSpPr>
+        <p:spPr/>
+        <p:txBody>
+          <a:bodyPr/>
+          <a:lstStyle/>
+          <a:p>
+            <a:fld id="{5D84065D-F351-4B03-BD91-D8A6B8D4B362}" type="slidenum">
+              <a:rPr lang="en-US" sz="3600" smtClean="0"/>
+              <a:t>6</a:t>
+            </a:fld>
+            <a:endParaRPr lang="en-US" sz="2400" dirty="0"/>
+          </a:p>
+        </p:txBody>
+      </p:sp>
+      <p:sp>
+        <p:nvSpPr>
+          <p:cNvPr id="4" name="Content Placeholder 3"/>
+          <p:cNvSpPr>
+            <a:spLocks noGrp="1"/>
+          </p:cNvSpPr>
+          <p:nvPr>
+            <p:ph idx="1"/>
+          </p:nvPr>
+        </p:nvSpPr>
+        <p:spPr/>
+        <p:txBody>
+          <a:bodyPr/>
+          <a:lstStyle/>
+          <a:p>
+            <a:r>
+              <a:rPr lang="en-US" dirty="0" smtClean="0"/>
+              <a:t>Taking  path as input until it takes </a:t>
+            </a:r>
+          </a:p>
+          <a:p>
+            <a:pPr marL="0" indent="0">
+              <a:buNone/>
+            </a:pPr>
+            <a:r>
+              <a:rPr lang="en-US" dirty="0"/>
+              <a:t> </a:t>
+            </a:r>
+            <a:r>
+              <a:rPr lang="en-US" dirty="0" smtClean="0"/>
+              <a:t>   a proper file path as input</a:t>
+            </a:r>
+          </a:p>
+        </p:txBody>
+      </p:sp>
       <p:pic>
         <p:nvPicPr>
-          <p:cNvPr id="7" name="Picture 6"/>
+          <p:cNvPr id="6" name="Picture 5"/>
           <p:cNvPicPr>
             <a:picLocks noChangeAspect="1"/>
           </p:cNvPicPr>
@@ -7345,61 +8280,19 @@
               </a:ext>
             </a:extLst>
           </a:blip>
-          <a:srcRect l="9860" t="20925" r="56978" b="45142"/>
+          <a:srcRect l="7962" t="17702" r="68236" b="63949"/>
           <a:stretch/>
         </p:blipFill>
         <p:spPr>
           <a:xfrm>
-            <a:off x="6096000" y="2691683"/>
-            <a:ext cx="4487212" cy="2581445"/>
+            <a:off x="5768787" y="2702860"/>
+            <a:ext cx="5486401" cy="2729752"/>
           </a:xfrm>
           <a:prstGeom prst="rect">
             <a:avLst/>
           </a:prstGeom>
         </p:spPr>
       </p:pic>
-      <p:sp>
-        <p:nvSpPr>
-          <p:cNvPr id="3" name="Slide Number Placeholder 2"/>
-          <p:cNvSpPr>
-            <a:spLocks noGrp="1"/>
-          </p:cNvSpPr>
-          <p:nvPr>
-            <p:ph type="sldNum" sz="quarter" idx="12"/>
-          </p:nvPr>
-        </p:nvSpPr>
-        <p:spPr/>
-        <p:txBody>
-          <a:bodyPr/>
-          <a:lstStyle/>
-          <a:p>
-            <a:fld id="{5D84065D-F351-4B03-BD91-D8A6B8D4B362}" type="slidenum">
-              <a:rPr lang="en-US" sz="2400" smtClean="0"/>
-              <a:t>6</a:t>
-            </a:fld>
-            <a:endParaRPr lang="en-US" sz="2400" dirty="0"/>
-          </a:p>
-        </p:txBody>
-      </p:sp>
-      <p:sp>
-        <p:nvSpPr>
-          <p:cNvPr id="4" name="Content Placeholder 3"/>
-          <p:cNvSpPr>
-            <a:spLocks noGrp="1"/>
-          </p:cNvSpPr>
-          <p:nvPr>
-            <p:ph idx="1"/>
-          </p:nvPr>
-        </p:nvSpPr>
-        <p:spPr/>
-        <p:txBody>
-          <a:bodyPr/>
-          <a:lstStyle/>
-          <a:p>
-            <a:endParaRPr lang="en-US"/>
-          </a:p>
-        </p:txBody>
-      </p:sp>
     </p:spTree>
     <p:extLst>
       <p:ext uri="{BB962C8B-B14F-4D97-AF65-F5344CB8AC3E}">
@@ -7431,7 +8324,7 @@
                             </p:stCondLst>
                             <p:childTnLst>
                               <p:par>
-                                <p:cTn id="5" presetID="16" presetClass="entr" presetSubtype="21" fill="hold" nodeType="clickEffect">
+                                <p:cTn id="5" presetID="10" presetClass="entr" presetSubtype="0" fill="hold" grpId="0" nodeType="clickEffect">
                                   <p:stCondLst>
                                     <p:cond delay="0"/>
                                   </p:stCondLst>
@@ -7444,7 +8337,11 @@
                                           </p:stCondLst>
                                         </p:cTn>
                                         <p:tgtEl>
-                                          <p:spTgt spid="7"/>
+                                          <p:spTgt spid="4">
+                                            <p:txEl>
+                                              <p:pRg st="0" end="0"/>
+                                            </p:txEl>
+                                          </p:spTgt>
                                         </p:tgtEl>
                                         <p:attrNameLst>
                                           <p:attrName>style.visibility</p:attrName>
@@ -7454,11 +8351,129 @@
                                         <p:strVal val="visible"/>
                                       </p:to>
                                     </p:set>
-                                    <p:animEffect transition="in" filter="barn(inVertical)">
+                                    <p:animEffect transition="in" filter="fade">
                                       <p:cBhvr>
                                         <p:cTn id="7" dur="500"/>
                                         <p:tgtEl>
-                                          <p:spTgt spid="7"/>
+                                          <p:spTgt spid="4">
+                                            <p:txEl>
+                                              <p:pRg st="0" end="0"/>
+                                            </p:txEl>
+                                          </p:spTgt>
+                                        </p:tgtEl>
+                                      </p:cBhvr>
+                                    </p:animEffect>
+                                  </p:childTnLst>
+                                </p:cTn>
+                              </p:par>
+                            </p:childTnLst>
+                          </p:cTn>
+                        </p:par>
+                      </p:childTnLst>
+                    </p:cTn>
+                  </p:par>
+                  <p:par>
+                    <p:cTn id="8" fill="hold">
+                      <p:stCondLst>
+                        <p:cond delay="indefinite"/>
+                      </p:stCondLst>
+                      <p:childTnLst>
+                        <p:par>
+                          <p:cTn id="9" fill="hold">
+                            <p:stCondLst>
+                              <p:cond delay="0"/>
+                            </p:stCondLst>
+                            <p:childTnLst>
+                              <p:par>
+                                <p:cTn id="10" presetID="10" presetClass="entr" presetSubtype="0" fill="hold" grpId="0" nodeType="clickEffect">
+                                  <p:stCondLst>
+                                    <p:cond delay="0"/>
+                                  </p:stCondLst>
+                                  <p:childTnLst>
+                                    <p:set>
+                                      <p:cBhvr>
+                                        <p:cTn id="11" dur="1" fill="hold">
+                                          <p:stCondLst>
+                                            <p:cond delay="0"/>
+                                          </p:stCondLst>
+                                        </p:cTn>
+                                        <p:tgtEl>
+                                          <p:spTgt spid="4">
+                                            <p:txEl>
+                                              <p:pRg st="1" end="1"/>
+                                            </p:txEl>
+                                          </p:spTgt>
+                                        </p:tgtEl>
+                                        <p:attrNameLst>
+                                          <p:attrName>style.visibility</p:attrName>
+                                        </p:attrNameLst>
+                                      </p:cBhvr>
+                                      <p:to>
+                                        <p:strVal val="visible"/>
+                                      </p:to>
+                                    </p:set>
+                                    <p:animEffect transition="in" filter="fade">
+                                      <p:cBhvr>
+                                        <p:cTn id="12" dur="500"/>
+                                        <p:tgtEl>
+                                          <p:spTgt spid="4">
+                                            <p:txEl>
+                                              <p:pRg st="1" end="1"/>
+                                            </p:txEl>
+                                          </p:spTgt>
+                                        </p:tgtEl>
+                                      </p:cBhvr>
+                                    </p:animEffect>
+                                  </p:childTnLst>
+                                </p:cTn>
+                              </p:par>
+                            </p:childTnLst>
+                          </p:cTn>
+                        </p:par>
+                      </p:childTnLst>
+                    </p:cTn>
+                  </p:par>
+                  <p:par>
+                    <p:cTn id="13" fill="hold">
+                      <p:stCondLst>
+                        <p:cond delay="indefinite"/>
+                      </p:stCondLst>
+                      <p:childTnLst>
+                        <p:par>
+                          <p:cTn id="14" fill="hold">
+                            <p:stCondLst>
+                              <p:cond delay="0"/>
+                            </p:stCondLst>
+                            <p:childTnLst>
+                              <p:par>
+                                <p:cTn id="15" presetID="22" presetClass="entr" presetSubtype="4" fill="hold" nodeType="clickEffect">
+                                  <p:stCondLst>
+                                    <p:cond delay="0"/>
+                                  </p:stCondLst>
+                                  <p:childTnLst>
+                                    <p:set>
+                                      <p:cBhvr>
+                                        <p:cTn id="16" dur="1" fill="hold">
+                                          <p:stCondLst>
+                                            <p:cond delay="0"/>
+                                          </p:stCondLst>
+                                        </p:cTn>
+                                        <p:tgtEl>
+                                          <p:spTgt spid="6"/>
+                                        </p:tgtEl>
+                                        <p:attrNameLst>
+                                          <p:attrName>style.visibility</p:attrName>
+                                        </p:attrNameLst>
+                                      </p:cBhvr>
+                                      <p:to>
+                                        <p:strVal val="visible"/>
+                                      </p:to>
+                                    </p:set>
+                                    <p:animEffect transition="in" filter="wipe(down)">
+                                      <p:cBhvr>
+                                        <p:cTn id="17" dur="500"/>
+                                        <p:tgtEl>
+                                          <p:spTgt spid="6"/>
                                         </p:tgtEl>
                                       </p:cBhvr>
                                     </p:animEffect>
@@ -7492,6 +8507,9 @@
         </p:cTn>
       </p:par>
     </p:tnLst>
+    <p:bldLst>
+      <p:bldP spid="4" grpId="0" build="p"/>
+    </p:bldLst>
   </p:timing>
 </p:sld>
 </file>
@@ -7529,10 +8547,10 @@
           <a:lstStyle/>
           <a:p>
             <a:r>
-              <a:rPr lang="en-US" dirty="0" smtClean="0"/>
+              <a:rPr lang="en-US" b="1" dirty="0" smtClean="0"/>
               <a:t>READING AN IMAGE</a:t>
             </a:r>
-            <a:endParaRPr lang="en-US" dirty="0"/>
+            <a:endParaRPr lang="en-US" b="1" dirty="0"/>
           </a:p>
         </p:txBody>
       </p:sp>
@@ -7558,7 +8576,7 @@
         </p:blipFill>
         <p:spPr>
           <a:xfrm>
-            <a:off x="6857194" y="2449961"/>
+            <a:off x="6857193" y="2449961"/>
             <a:ext cx="3703481" cy="3555341"/>
           </a:xfrm>
           <a:prstGeom prst="rect">
@@ -7578,7 +8596,7 @@
         </p:nvSpPr>
         <p:spPr>
           <a:xfrm>
-            <a:off x="10469811" y="5889864"/>
+            <a:off x="10560674" y="5865602"/>
             <a:ext cx="542697" cy="279400"/>
           </a:xfrm>
         </p:spPr>
@@ -7587,7 +8605,7 @@
           <a:lstStyle/>
           <a:p>
             <a:fld id="{5D84065D-F351-4B03-BD91-D8A6B8D4B362}" type="slidenum">
-              <a:rPr lang="en-US" sz="2400" smtClean="0"/>
+              <a:rPr lang="en-US" sz="3600" smtClean="0"/>
               <a:t>7</a:t>
             </a:fld>
             <a:endParaRPr lang="en-US" sz="2400" dirty="0"/>
@@ -7609,7 +8627,33 @@
           <a:bodyPr/>
           <a:lstStyle/>
           <a:p>
-            <a:endParaRPr lang="en-US"/>
+            <a:r>
+              <a:rPr lang="en-US" dirty="0" smtClean="0"/>
+              <a:t>Reading the baboon.bmp image as input </a:t>
+            </a:r>
+          </a:p>
+          <a:p>
+            <a:r>
+              <a:rPr lang="en-US" dirty="0" smtClean="0"/>
+              <a:t>Reading header info</a:t>
+            </a:r>
+          </a:p>
+          <a:p>
+            <a:r>
+              <a:rPr lang="en-US" dirty="0" smtClean="0"/>
+              <a:t>Reading pixel data</a:t>
+            </a:r>
+          </a:p>
+          <a:p>
+            <a:r>
+              <a:rPr lang="en-US" dirty="0" smtClean="0"/>
+              <a:t>Storing the </a:t>
+            </a:r>
+            <a:r>
+              <a:rPr lang="en-US" dirty="0" err="1" smtClean="0"/>
+              <a:t>datas</a:t>
+            </a:r>
+            <a:endParaRPr lang="en-US" dirty="0"/>
           </a:p>
         </p:txBody>
       </p:sp>
@@ -7626,9 +8670,332 @@
   <p:timing>
     <p:tnLst>
       <p:par>
-        <p:cTn id="1" dur="indefinite" restart="never" nodeType="tmRoot"/>
+        <p:cTn id="1" dur="indefinite" restart="never" nodeType="tmRoot">
+          <p:childTnLst>
+            <p:seq concurrent="1" nextAc="seek">
+              <p:cTn id="2" dur="indefinite" nodeType="mainSeq">
+                <p:childTnLst>
+                  <p:par>
+                    <p:cTn id="3" fill="hold">
+                      <p:stCondLst>
+                        <p:cond delay="indefinite"/>
+                      </p:stCondLst>
+                      <p:childTnLst>
+                        <p:par>
+                          <p:cTn id="4" fill="hold">
+                            <p:stCondLst>
+                              <p:cond delay="0"/>
+                            </p:stCondLst>
+                            <p:childTnLst>
+                              <p:par>
+                                <p:cTn id="5" presetID="6" presetClass="entr" presetSubtype="16" fill="hold" nodeType="clickEffect">
+                                  <p:stCondLst>
+                                    <p:cond delay="0"/>
+                                  </p:stCondLst>
+                                  <p:childTnLst>
+                                    <p:set>
+                                      <p:cBhvr>
+                                        <p:cTn id="6" dur="1" fill="hold">
+                                          <p:stCondLst>
+                                            <p:cond delay="0"/>
+                                          </p:stCondLst>
+                                        </p:cTn>
+                                        <p:tgtEl>
+                                          <p:spTgt spid="3"/>
+                                        </p:tgtEl>
+                                        <p:attrNameLst>
+                                          <p:attrName>style.visibility</p:attrName>
+                                        </p:attrNameLst>
+                                      </p:cBhvr>
+                                      <p:to>
+                                        <p:strVal val="visible"/>
+                                      </p:to>
+                                    </p:set>
+                                    <p:animEffect transition="in" filter="circle(in)">
+                                      <p:cBhvr>
+                                        <p:cTn id="7" dur="2000"/>
+                                        <p:tgtEl>
+                                          <p:spTgt spid="3"/>
+                                        </p:tgtEl>
+                                      </p:cBhvr>
+                                    </p:animEffect>
+                                  </p:childTnLst>
+                                </p:cTn>
+                              </p:par>
+                            </p:childTnLst>
+                          </p:cTn>
+                        </p:par>
+                      </p:childTnLst>
+                    </p:cTn>
+                  </p:par>
+                  <p:par>
+                    <p:cTn id="8" fill="hold">
+                      <p:stCondLst>
+                        <p:cond delay="indefinite"/>
+                      </p:stCondLst>
+                      <p:childTnLst>
+                        <p:par>
+                          <p:cTn id="9" fill="hold">
+                            <p:stCondLst>
+                              <p:cond delay="0"/>
+                            </p:stCondLst>
+                            <p:childTnLst>
+                              <p:par>
+                                <p:cTn id="10" presetID="10" presetClass="entr" presetSubtype="0" fill="hold" grpId="0" nodeType="clickEffect">
+                                  <p:stCondLst>
+                                    <p:cond delay="0"/>
+                                  </p:stCondLst>
+                                  <p:childTnLst>
+                                    <p:set>
+                                      <p:cBhvr>
+                                        <p:cTn id="11" dur="1" fill="hold">
+                                          <p:stCondLst>
+                                            <p:cond delay="0"/>
+                                          </p:stCondLst>
+                                        </p:cTn>
+                                        <p:tgtEl>
+                                          <p:spTgt spid="7">
+                                            <p:txEl>
+                                              <p:pRg st="0" end="0"/>
+                                            </p:txEl>
+                                          </p:spTgt>
+                                        </p:tgtEl>
+                                        <p:attrNameLst>
+                                          <p:attrName>style.visibility</p:attrName>
+                                        </p:attrNameLst>
+                                      </p:cBhvr>
+                                      <p:to>
+                                        <p:strVal val="visible"/>
+                                      </p:to>
+                                    </p:set>
+                                    <p:animEffect transition="in" filter="fade">
+                                      <p:cBhvr>
+                                        <p:cTn id="12" dur="500"/>
+                                        <p:tgtEl>
+                                          <p:spTgt spid="7">
+                                            <p:txEl>
+                                              <p:pRg st="0" end="0"/>
+                                            </p:txEl>
+                                          </p:spTgt>
+                                        </p:tgtEl>
+                                      </p:cBhvr>
+                                    </p:animEffect>
+                                  </p:childTnLst>
+                                </p:cTn>
+                              </p:par>
+                            </p:childTnLst>
+                          </p:cTn>
+                        </p:par>
+                      </p:childTnLst>
+                    </p:cTn>
+                  </p:par>
+                  <p:par>
+                    <p:cTn id="13" fill="hold">
+                      <p:stCondLst>
+                        <p:cond delay="indefinite"/>
+                      </p:stCondLst>
+                      <p:childTnLst>
+                        <p:par>
+                          <p:cTn id="14" fill="hold">
+                            <p:stCondLst>
+                              <p:cond delay="0"/>
+                            </p:stCondLst>
+                            <p:childTnLst>
+                              <p:par>
+                                <p:cTn id="15" presetID="10" presetClass="entr" presetSubtype="0" fill="hold" grpId="0" nodeType="clickEffect">
+                                  <p:stCondLst>
+                                    <p:cond delay="0"/>
+                                  </p:stCondLst>
+                                  <p:childTnLst>
+                                    <p:set>
+                                      <p:cBhvr>
+                                        <p:cTn id="16" dur="1" fill="hold">
+                                          <p:stCondLst>
+                                            <p:cond delay="0"/>
+                                          </p:stCondLst>
+                                        </p:cTn>
+                                        <p:tgtEl>
+                                          <p:spTgt spid="7">
+                                            <p:txEl>
+                                              <p:pRg st="1" end="1"/>
+                                            </p:txEl>
+                                          </p:spTgt>
+                                        </p:tgtEl>
+                                        <p:attrNameLst>
+                                          <p:attrName>style.visibility</p:attrName>
+                                        </p:attrNameLst>
+                                      </p:cBhvr>
+                                      <p:to>
+                                        <p:strVal val="visible"/>
+                                      </p:to>
+                                    </p:set>
+                                    <p:animEffect transition="in" filter="fade">
+                                      <p:cBhvr>
+                                        <p:cTn id="17" dur="500"/>
+                                        <p:tgtEl>
+                                          <p:spTgt spid="7">
+                                            <p:txEl>
+                                              <p:pRg st="1" end="1"/>
+                                            </p:txEl>
+                                          </p:spTgt>
+                                        </p:tgtEl>
+                                      </p:cBhvr>
+                                    </p:animEffect>
+                                  </p:childTnLst>
+                                </p:cTn>
+                              </p:par>
+                            </p:childTnLst>
+                          </p:cTn>
+                        </p:par>
+                      </p:childTnLst>
+                    </p:cTn>
+                  </p:par>
+                  <p:par>
+                    <p:cTn id="18" fill="hold">
+                      <p:stCondLst>
+                        <p:cond delay="indefinite"/>
+                      </p:stCondLst>
+                      <p:childTnLst>
+                        <p:par>
+                          <p:cTn id="19" fill="hold">
+                            <p:stCondLst>
+                              <p:cond delay="0"/>
+                            </p:stCondLst>
+                            <p:childTnLst>
+                              <p:par>
+                                <p:cTn id="20" presetID="10" presetClass="entr" presetSubtype="0" fill="hold" grpId="0" nodeType="clickEffect">
+                                  <p:stCondLst>
+                                    <p:cond delay="0"/>
+                                  </p:stCondLst>
+                                  <p:childTnLst>
+                                    <p:set>
+                                      <p:cBhvr>
+                                        <p:cTn id="21" dur="1" fill="hold">
+                                          <p:stCondLst>
+                                            <p:cond delay="0"/>
+                                          </p:stCondLst>
+                                        </p:cTn>
+                                        <p:tgtEl>
+                                          <p:spTgt spid="7">
+                                            <p:txEl>
+                                              <p:pRg st="2" end="2"/>
+                                            </p:txEl>
+                                          </p:spTgt>
+                                        </p:tgtEl>
+                                        <p:attrNameLst>
+                                          <p:attrName>style.visibility</p:attrName>
+                                        </p:attrNameLst>
+                                      </p:cBhvr>
+                                      <p:to>
+                                        <p:strVal val="visible"/>
+                                      </p:to>
+                                    </p:set>
+                                    <p:animEffect transition="in" filter="fade">
+                                      <p:cBhvr>
+                                        <p:cTn id="22" dur="500"/>
+                                        <p:tgtEl>
+                                          <p:spTgt spid="7">
+                                            <p:txEl>
+                                              <p:pRg st="2" end="2"/>
+                                            </p:txEl>
+                                          </p:spTgt>
+                                        </p:tgtEl>
+                                      </p:cBhvr>
+                                    </p:animEffect>
+                                  </p:childTnLst>
+                                </p:cTn>
+                              </p:par>
+                            </p:childTnLst>
+                          </p:cTn>
+                        </p:par>
+                      </p:childTnLst>
+                    </p:cTn>
+                  </p:par>
+                  <p:par>
+                    <p:cTn id="23" fill="hold">
+                      <p:stCondLst>
+                        <p:cond delay="indefinite"/>
+                      </p:stCondLst>
+                      <p:childTnLst>
+                        <p:par>
+                          <p:cTn id="24" fill="hold">
+                            <p:stCondLst>
+                              <p:cond delay="0"/>
+                            </p:stCondLst>
+                            <p:childTnLst>
+                              <p:par>
+                                <p:cTn id="25" presetID="10" presetClass="entr" presetSubtype="0" fill="hold" grpId="0" nodeType="clickEffect">
+                                  <p:stCondLst>
+                                    <p:cond delay="0"/>
+                                  </p:stCondLst>
+                                  <p:childTnLst>
+                                    <p:set>
+                                      <p:cBhvr>
+                                        <p:cTn id="26" dur="1" fill="hold">
+                                          <p:stCondLst>
+                                            <p:cond delay="0"/>
+                                          </p:stCondLst>
+                                        </p:cTn>
+                                        <p:tgtEl>
+                                          <p:spTgt spid="7">
+                                            <p:txEl>
+                                              <p:pRg st="3" end="3"/>
+                                            </p:txEl>
+                                          </p:spTgt>
+                                        </p:tgtEl>
+                                        <p:attrNameLst>
+                                          <p:attrName>style.visibility</p:attrName>
+                                        </p:attrNameLst>
+                                      </p:cBhvr>
+                                      <p:to>
+                                        <p:strVal val="visible"/>
+                                      </p:to>
+                                    </p:set>
+                                    <p:animEffect transition="in" filter="fade">
+                                      <p:cBhvr>
+                                        <p:cTn id="27" dur="500"/>
+                                        <p:tgtEl>
+                                          <p:spTgt spid="7">
+                                            <p:txEl>
+                                              <p:pRg st="3" end="3"/>
+                                            </p:txEl>
+                                          </p:spTgt>
+                                        </p:tgtEl>
+                                      </p:cBhvr>
+                                    </p:animEffect>
+                                  </p:childTnLst>
+                                </p:cTn>
+                              </p:par>
+                            </p:childTnLst>
+                          </p:cTn>
+                        </p:par>
+                      </p:childTnLst>
+                    </p:cTn>
+                  </p:par>
+                </p:childTnLst>
+              </p:cTn>
+              <p:prevCondLst>
+                <p:cond evt="onPrev" delay="0">
+                  <p:tgtEl>
+                    <p:sldTgt/>
+                  </p:tgtEl>
+                </p:cond>
+              </p:prevCondLst>
+              <p:nextCondLst>
+                <p:cond evt="onNext" delay="0">
+                  <p:tgtEl>
+                    <p:sldTgt/>
+                  </p:tgtEl>
+                </p:cond>
+              </p:nextCondLst>
+            </p:seq>
+          </p:childTnLst>
+        </p:cTn>
       </p:par>
     </p:tnLst>
+    <p:bldLst>
+      <p:bldP spid="7" grpId="0" build="p"/>
+    </p:bldLst>
   </p:timing>
 </p:sld>
 </file>
@@ -7717,13 +9084,60 @@
         </p:nvSpPr>
         <p:spPr/>
         <p:txBody>
-          <a:bodyPr/>
+          <a:bodyPr>
+            <a:normAutofit/>
+          </a:bodyPr>
           <a:lstStyle/>
           <a:p>
             <a:r>
               <a:rPr lang="en-US" dirty="0" smtClean="0"/>
-              <a:t>Algorithm :</a:t>
-            </a:r>
+              <a:t>Algorithm </a:t>
+            </a:r>
+            <a:r>
+              <a:rPr lang="en-US" dirty="0" smtClean="0"/>
+              <a:t>:</a:t>
+            </a:r>
+          </a:p>
+          <a:p>
+            <a:r>
+              <a:rPr lang="en-US" dirty="0" smtClean="0"/>
+              <a:t> pixels[</a:t>
+            </a:r>
+            <a:r>
+              <a:rPr lang="en-US" dirty="0" err="1" smtClean="0"/>
+              <a:t>totalsize</a:t>
+            </a:r>
+            <a:r>
+              <a:rPr lang="en-US" dirty="0" smtClean="0"/>
+              <a:t> ] </a:t>
+            </a:r>
+          </a:p>
+          <a:p>
+            <a:r>
+              <a:rPr lang="en-US" dirty="0" smtClean="0"/>
+              <a:t>While (index&lt;</a:t>
+            </a:r>
+            <a:r>
+              <a:rPr lang="en-US" dirty="0" err="1" smtClean="0"/>
+              <a:t>totalsize</a:t>
+            </a:r>
+            <a:r>
+              <a:rPr lang="en-US" dirty="0" smtClean="0"/>
+              <a:t>)</a:t>
+            </a:r>
+          </a:p>
+          <a:p>
+            <a:r>
+              <a:rPr lang="en-US" dirty="0" smtClean="0"/>
+              <a:t>Take Average of RGB i.e. (R+G+B)/3</a:t>
+            </a:r>
+          </a:p>
+          <a:p>
+            <a:r>
+              <a:rPr lang="en-US" dirty="0" smtClean="0"/>
+              <a:t>Index+=3</a:t>
+            </a:r>
+            <a:endParaRPr lang="en-US" dirty="0" smtClean="0"/>
           </a:p>
           <a:p>
             <a:pPr marL="0" indent="0">
@@ -7746,13 +9160,18 @@
             <p:ph type="sldNum" sz="quarter" idx="12"/>
           </p:nvPr>
         </p:nvSpPr>
-        <p:spPr/>
+        <p:spPr>
+          <a:xfrm>
+            <a:off x="10534026" y="5924281"/>
+            <a:ext cx="542697" cy="285482"/>
+          </a:xfrm>
+        </p:spPr>
         <p:txBody>
           <a:bodyPr/>
           <a:lstStyle/>
           <a:p>
             <a:fld id="{5D84065D-F351-4B03-BD91-D8A6B8D4B362}" type="slidenum">
-              <a:rPr lang="en-US" sz="2400" smtClean="0"/>
+              <a:rPr lang="en-US" sz="3600" smtClean="0"/>
               <a:t>8</a:t>
             </a:fld>
             <a:endParaRPr lang="en-US" sz="2400" dirty="0"/>
@@ -7772,9 +9191,454 @@
   <p:timing>
     <p:tnLst>
       <p:par>
-        <p:cTn id="1" dur="indefinite" restart="never" nodeType="tmRoot"/>
+        <p:cTn id="1" dur="indefinite" restart="never" nodeType="tmRoot">
+          <p:childTnLst>
+            <p:seq concurrent="1" nextAc="seek">
+              <p:cTn id="2" dur="indefinite" nodeType="mainSeq">
+                <p:childTnLst>
+                  <p:par>
+                    <p:cTn id="3" fill="hold">
+                      <p:stCondLst>
+                        <p:cond delay="indefinite"/>
+                      </p:stCondLst>
+                      <p:childTnLst>
+                        <p:par>
+                          <p:cTn id="4" fill="hold">
+                            <p:stCondLst>
+                              <p:cond delay="0"/>
+                            </p:stCondLst>
+                            <p:childTnLst>
+                              <p:par>
+                                <p:cTn id="5" presetID="10" presetClass="entr" presetSubtype="0" fill="hold" grpId="0" nodeType="clickEffect">
+                                  <p:stCondLst>
+                                    <p:cond delay="0"/>
+                                  </p:stCondLst>
+                                  <p:childTnLst>
+                                    <p:set>
+                                      <p:cBhvr>
+                                        <p:cTn id="6" dur="1" fill="hold">
+                                          <p:stCondLst>
+                                            <p:cond delay="0"/>
+                                          </p:stCondLst>
+                                        </p:cTn>
+                                        <p:tgtEl>
+                                          <p:spTgt spid="5">
+                                            <p:txEl>
+                                              <p:pRg st="0" end="0"/>
+                                            </p:txEl>
+                                          </p:spTgt>
+                                        </p:tgtEl>
+                                        <p:attrNameLst>
+                                          <p:attrName>style.visibility</p:attrName>
+                                        </p:attrNameLst>
+                                      </p:cBhvr>
+                                      <p:to>
+                                        <p:strVal val="visible"/>
+                                      </p:to>
+                                    </p:set>
+                                    <p:animEffect transition="in" filter="fade">
+                                      <p:cBhvr>
+                                        <p:cTn id="7" dur="500"/>
+                                        <p:tgtEl>
+                                          <p:spTgt spid="5">
+                                            <p:txEl>
+                                              <p:pRg st="0" end="0"/>
+                                            </p:txEl>
+                                          </p:spTgt>
+                                        </p:tgtEl>
+                                      </p:cBhvr>
+                                    </p:animEffect>
+                                  </p:childTnLst>
+                                </p:cTn>
+                              </p:par>
+                            </p:childTnLst>
+                          </p:cTn>
+                        </p:par>
+                      </p:childTnLst>
+                    </p:cTn>
+                  </p:par>
+                  <p:par>
+                    <p:cTn id="8" fill="hold">
+                      <p:stCondLst>
+                        <p:cond delay="indefinite"/>
+                      </p:stCondLst>
+                      <p:childTnLst>
+                        <p:par>
+                          <p:cTn id="9" fill="hold">
+                            <p:stCondLst>
+                              <p:cond delay="0"/>
+                            </p:stCondLst>
+                            <p:childTnLst>
+                              <p:par>
+                                <p:cTn id="10" presetID="10" presetClass="entr" presetSubtype="0" fill="hold" grpId="0" nodeType="clickEffect">
+                                  <p:stCondLst>
+                                    <p:cond delay="0"/>
+                                  </p:stCondLst>
+                                  <p:childTnLst>
+                                    <p:set>
+                                      <p:cBhvr>
+                                        <p:cTn id="11" dur="1" fill="hold">
+                                          <p:stCondLst>
+                                            <p:cond delay="0"/>
+                                          </p:stCondLst>
+                                        </p:cTn>
+                                        <p:tgtEl>
+                                          <p:spTgt spid="5">
+                                            <p:txEl>
+                                              <p:pRg st="1" end="1"/>
+                                            </p:txEl>
+                                          </p:spTgt>
+                                        </p:tgtEl>
+                                        <p:attrNameLst>
+                                          <p:attrName>style.visibility</p:attrName>
+                                        </p:attrNameLst>
+                                      </p:cBhvr>
+                                      <p:to>
+                                        <p:strVal val="visible"/>
+                                      </p:to>
+                                    </p:set>
+                                    <p:animEffect transition="in" filter="fade">
+                                      <p:cBhvr>
+                                        <p:cTn id="12" dur="500"/>
+                                        <p:tgtEl>
+                                          <p:spTgt spid="5">
+                                            <p:txEl>
+                                              <p:pRg st="1" end="1"/>
+                                            </p:txEl>
+                                          </p:spTgt>
+                                        </p:tgtEl>
+                                      </p:cBhvr>
+                                    </p:animEffect>
+                                  </p:childTnLst>
+                                </p:cTn>
+                              </p:par>
+                            </p:childTnLst>
+                          </p:cTn>
+                        </p:par>
+                      </p:childTnLst>
+                    </p:cTn>
+                  </p:par>
+                  <p:par>
+                    <p:cTn id="13" fill="hold">
+                      <p:stCondLst>
+                        <p:cond delay="indefinite"/>
+                      </p:stCondLst>
+                      <p:childTnLst>
+                        <p:par>
+                          <p:cTn id="14" fill="hold">
+                            <p:stCondLst>
+                              <p:cond delay="0"/>
+                            </p:stCondLst>
+                            <p:childTnLst>
+                              <p:par>
+                                <p:cTn id="15" presetID="10" presetClass="entr" presetSubtype="0" fill="hold" grpId="0" nodeType="clickEffect">
+                                  <p:stCondLst>
+                                    <p:cond delay="0"/>
+                                  </p:stCondLst>
+                                  <p:childTnLst>
+                                    <p:set>
+                                      <p:cBhvr>
+                                        <p:cTn id="16" dur="1" fill="hold">
+                                          <p:stCondLst>
+                                            <p:cond delay="0"/>
+                                          </p:stCondLst>
+                                        </p:cTn>
+                                        <p:tgtEl>
+                                          <p:spTgt spid="5">
+                                            <p:txEl>
+                                              <p:pRg st="2" end="2"/>
+                                            </p:txEl>
+                                          </p:spTgt>
+                                        </p:tgtEl>
+                                        <p:attrNameLst>
+                                          <p:attrName>style.visibility</p:attrName>
+                                        </p:attrNameLst>
+                                      </p:cBhvr>
+                                      <p:to>
+                                        <p:strVal val="visible"/>
+                                      </p:to>
+                                    </p:set>
+                                    <p:animEffect transition="in" filter="fade">
+                                      <p:cBhvr>
+                                        <p:cTn id="17" dur="500"/>
+                                        <p:tgtEl>
+                                          <p:spTgt spid="5">
+                                            <p:txEl>
+                                              <p:pRg st="2" end="2"/>
+                                            </p:txEl>
+                                          </p:spTgt>
+                                        </p:tgtEl>
+                                      </p:cBhvr>
+                                    </p:animEffect>
+                                  </p:childTnLst>
+                                </p:cTn>
+                              </p:par>
+                            </p:childTnLst>
+                          </p:cTn>
+                        </p:par>
+                      </p:childTnLst>
+                    </p:cTn>
+                  </p:par>
+                  <p:par>
+                    <p:cTn id="18" fill="hold">
+                      <p:stCondLst>
+                        <p:cond delay="indefinite"/>
+                      </p:stCondLst>
+                      <p:childTnLst>
+                        <p:par>
+                          <p:cTn id="19" fill="hold">
+                            <p:stCondLst>
+                              <p:cond delay="0"/>
+                            </p:stCondLst>
+                            <p:childTnLst>
+                              <p:par>
+                                <p:cTn id="20" presetID="10" presetClass="entr" presetSubtype="0" fill="hold" grpId="0" nodeType="clickEffect">
+                                  <p:stCondLst>
+                                    <p:cond delay="0"/>
+                                  </p:stCondLst>
+                                  <p:childTnLst>
+                                    <p:set>
+                                      <p:cBhvr>
+                                        <p:cTn id="21" dur="1" fill="hold">
+                                          <p:stCondLst>
+                                            <p:cond delay="0"/>
+                                          </p:stCondLst>
+                                        </p:cTn>
+                                        <p:tgtEl>
+                                          <p:spTgt spid="5">
+                                            <p:txEl>
+                                              <p:pRg st="3" end="3"/>
+                                            </p:txEl>
+                                          </p:spTgt>
+                                        </p:tgtEl>
+                                        <p:attrNameLst>
+                                          <p:attrName>style.visibility</p:attrName>
+                                        </p:attrNameLst>
+                                      </p:cBhvr>
+                                      <p:to>
+                                        <p:strVal val="visible"/>
+                                      </p:to>
+                                    </p:set>
+                                    <p:animEffect transition="in" filter="fade">
+                                      <p:cBhvr>
+                                        <p:cTn id="22" dur="500"/>
+                                        <p:tgtEl>
+                                          <p:spTgt spid="5">
+                                            <p:txEl>
+                                              <p:pRg st="3" end="3"/>
+                                            </p:txEl>
+                                          </p:spTgt>
+                                        </p:tgtEl>
+                                      </p:cBhvr>
+                                    </p:animEffect>
+                                  </p:childTnLst>
+                                </p:cTn>
+                              </p:par>
+                            </p:childTnLst>
+                          </p:cTn>
+                        </p:par>
+                      </p:childTnLst>
+                    </p:cTn>
+                  </p:par>
+                  <p:par>
+                    <p:cTn id="23" fill="hold">
+                      <p:stCondLst>
+                        <p:cond delay="indefinite"/>
+                      </p:stCondLst>
+                      <p:childTnLst>
+                        <p:par>
+                          <p:cTn id="24" fill="hold">
+                            <p:stCondLst>
+                              <p:cond delay="0"/>
+                            </p:stCondLst>
+                            <p:childTnLst>
+                              <p:par>
+                                <p:cTn id="25" presetID="10" presetClass="entr" presetSubtype="0" fill="hold" grpId="0" nodeType="clickEffect">
+                                  <p:stCondLst>
+                                    <p:cond delay="0"/>
+                                  </p:stCondLst>
+                                  <p:childTnLst>
+                                    <p:set>
+                                      <p:cBhvr>
+                                        <p:cTn id="26" dur="1" fill="hold">
+                                          <p:stCondLst>
+                                            <p:cond delay="0"/>
+                                          </p:stCondLst>
+                                        </p:cTn>
+                                        <p:tgtEl>
+                                          <p:spTgt spid="5">
+                                            <p:txEl>
+                                              <p:pRg st="4" end="4"/>
+                                            </p:txEl>
+                                          </p:spTgt>
+                                        </p:tgtEl>
+                                        <p:attrNameLst>
+                                          <p:attrName>style.visibility</p:attrName>
+                                        </p:attrNameLst>
+                                      </p:cBhvr>
+                                      <p:to>
+                                        <p:strVal val="visible"/>
+                                      </p:to>
+                                    </p:set>
+                                    <p:animEffect transition="in" filter="fade">
+                                      <p:cBhvr>
+                                        <p:cTn id="27" dur="500"/>
+                                        <p:tgtEl>
+                                          <p:spTgt spid="5">
+                                            <p:txEl>
+                                              <p:pRg st="4" end="4"/>
+                                            </p:txEl>
+                                          </p:spTgt>
+                                        </p:tgtEl>
+                                      </p:cBhvr>
+                                    </p:animEffect>
+                                  </p:childTnLst>
+                                </p:cTn>
+                              </p:par>
+                            </p:childTnLst>
+                          </p:cTn>
+                        </p:par>
+                      </p:childTnLst>
+                    </p:cTn>
+                  </p:par>
+                  <p:par>
+                    <p:cTn id="28" fill="hold">
+                      <p:stCondLst>
+                        <p:cond delay="indefinite"/>
+                      </p:stCondLst>
+                      <p:childTnLst>
+                        <p:par>
+                          <p:cTn id="29" fill="hold">
+                            <p:stCondLst>
+                              <p:cond delay="0"/>
+                            </p:stCondLst>
+                            <p:childTnLst>
+                              <p:par>
+                                <p:cTn id="30" presetID="10" presetClass="entr" presetSubtype="0" fill="hold" grpId="0" nodeType="clickEffect">
+                                  <p:stCondLst>
+                                    <p:cond delay="0"/>
+                                  </p:stCondLst>
+                                  <p:childTnLst>
+                                    <p:set>
+                                      <p:cBhvr>
+                                        <p:cTn id="31" dur="1" fill="hold">
+                                          <p:stCondLst>
+                                            <p:cond delay="0"/>
+                                          </p:stCondLst>
+                                        </p:cTn>
+                                        <p:tgtEl>
+                                          <p:spTgt spid="5">
+                                            <p:txEl>
+                                              <p:pRg st="5" end="5"/>
+                                            </p:txEl>
+                                          </p:spTgt>
+                                        </p:tgtEl>
+                                        <p:attrNameLst>
+                                          <p:attrName>style.visibility</p:attrName>
+                                        </p:attrNameLst>
+                                      </p:cBhvr>
+                                      <p:to>
+                                        <p:strVal val="visible"/>
+                                      </p:to>
+                                    </p:set>
+                                    <p:animEffect transition="in" filter="fade">
+                                      <p:cBhvr>
+                                        <p:cTn id="32" dur="500"/>
+                                        <p:tgtEl>
+                                          <p:spTgt spid="5">
+                                            <p:txEl>
+                                              <p:pRg st="5" end="5"/>
+                                            </p:txEl>
+                                          </p:spTgt>
+                                        </p:tgtEl>
+                                      </p:cBhvr>
+                                    </p:animEffect>
+                                  </p:childTnLst>
+                                </p:cTn>
+                              </p:par>
+                            </p:childTnLst>
+                          </p:cTn>
+                        </p:par>
+                      </p:childTnLst>
+                    </p:cTn>
+                  </p:par>
+                  <p:par>
+                    <p:cTn id="33" fill="hold">
+                      <p:stCondLst>
+                        <p:cond delay="indefinite"/>
+                      </p:stCondLst>
+                      <p:childTnLst>
+                        <p:par>
+                          <p:cTn id="34" fill="hold">
+                            <p:stCondLst>
+                              <p:cond delay="0"/>
+                            </p:stCondLst>
+                            <p:childTnLst>
+                              <p:par>
+                                <p:cTn id="35" presetID="22" presetClass="entr" presetSubtype="2" fill="hold" nodeType="clickEffect">
+                                  <p:stCondLst>
+                                    <p:cond delay="0"/>
+                                  </p:stCondLst>
+                                  <p:childTnLst>
+                                    <p:set>
+                                      <p:cBhvr>
+                                        <p:cTn id="36" dur="1" fill="hold">
+                                          <p:stCondLst>
+                                            <p:cond delay="0"/>
+                                          </p:stCondLst>
+                                        </p:cTn>
+                                        <p:tgtEl>
+                                          <p:spTgt spid="3"/>
+                                        </p:tgtEl>
+                                        <p:attrNameLst>
+                                          <p:attrName>style.visibility</p:attrName>
+                                        </p:attrNameLst>
+                                      </p:cBhvr>
+                                      <p:to>
+                                        <p:strVal val="visible"/>
+                                      </p:to>
+                                    </p:set>
+                                    <p:animEffect transition="in" filter="wipe(right)">
+                                      <p:cBhvr>
+                                        <p:cTn id="37" dur="500"/>
+                                        <p:tgtEl>
+                                          <p:spTgt spid="3"/>
+                                        </p:tgtEl>
+                                      </p:cBhvr>
+                                    </p:animEffect>
+                                  </p:childTnLst>
+                                </p:cTn>
+                              </p:par>
+                            </p:childTnLst>
+                          </p:cTn>
+                        </p:par>
+                      </p:childTnLst>
+                    </p:cTn>
+                  </p:par>
+                </p:childTnLst>
+              </p:cTn>
+              <p:prevCondLst>
+                <p:cond evt="onPrev" delay="0">
+                  <p:tgtEl>
+                    <p:sldTgt/>
+                  </p:tgtEl>
+                </p:cond>
+              </p:prevCondLst>
+              <p:nextCondLst>
+                <p:cond evt="onNext" delay="0">
+                  <p:tgtEl>
+                    <p:sldTgt/>
+                  </p:tgtEl>
+                </p:cond>
+              </p:nextCondLst>
+            </p:seq>
+          </p:childTnLst>
+        </p:cTn>
       </p:par>
     </p:tnLst>
+    <p:bldLst>
+      <p:bldP spid="5" grpId="0" build="p"/>
+    </p:bldLst>
   </p:timing>
 </p:sld>
 </file>
@@ -7850,18 +9714,13 @@
             </a:pPr>
             <a:r>
               <a:rPr lang="en-US" sz="3200" dirty="0" smtClean="0"/>
-              <a:t> Structure of a .bmp format image file</a:t>
-            </a:r>
-          </a:p>
-          <a:p>
-            <a:pPr>
-              <a:buFont typeface="Wingdings" panose="05000000000000000000" pitchFamily="2" charset="2"/>
-              <a:buChar char="Ø"/>
-            </a:pPr>
+              <a:t> Structure of a .bmp format image </a:t>
+            </a:r>
             <a:r>
               <a:rPr lang="en-US" sz="3200" dirty="0" smtClean="0"/>
-              <a:t> Ways to read the header info for .Bmp image file</a:t>
-            </a:r>
+              <a:t>file</a:t>
+            </a:r>
+            <a:endParaRPr lang="en-US" sz="3200" dirty="0" smtClean="0"/>
           </a:p>
           <a:p>
             <a:pPr>
@@ -7902,13 +9761,18 @@
             <p:ph type="sldNum" sz="quarter" idx="12"/>
           </p:nvPr>
         </p:nvSpPr>
-        <p:spPr/>
+        <p:spPr>
+          <a:xfrm>
+            <a:off x="10482690" y="5904606"/>
+            <a:ext cx="542697" cy="279400"/>
+          </a:xfrm>
+        </p:spPr>
         <p:txBody>
           <a:bodyPr/>
           <a:lstStyle/>
           <a:p>
             <a:fld id="{5D84065D-F351-4B03-BD91-D8A6B8D4B362}" type="slidenum">
-              <a:rPr lang="en-US" sz="2400" smtClean="0"/>
+              <a:rPr lang="en-US" sz="3600" smtClean="0"/>
               <a:t>9</a:t>
             </a:fld>
             <a:endParaRPr lang="en-US" dirty="0"/>
@@ -7978,7 +9842,7 @@
     </a:clrScheme>
     <a:fontScheme name="Organic">
       <a:majorFont>
-        <a:latin typeface="Garamond" panose="02020404030301010803"/>
+        <a:latin typeface="Garamond"/>
         <a:ea typeface=""/>
         <a:cs typeface=""/>
         <a:font script="Jpan" typeface="ＭＳ Ｐゴシック"/>
@@ -8013,7 +9877,7 @@
         <a:font script="Geor" typeface="Sylfaen"/>
       </a:majorFont>
       <a:minorFont>
-        <a:latin typeface="Garamond" panose="02020404030301010803"/>
+        <a:latin typeface="Garamond"/>
         <a:ea typeface=""/>
         <a:cs typeface=""/>
         <a:font script="Jpan" typeface="ＭＳ Ｐ明朝"/>
@@ -8162,7 +10026,7 @@
   <a:extraClrSchemeLst/>
   <a:extLst>
     <a:ext uri="{05A4C25C-085E-4340-85A3-A5531E510DB2}">
-      <thm15:themeFamily xmlns:thm15="http://schemas.microsoft.com/office/thememl/2012/main" name="Organic" id="{28CDC826-8792-45C0-861B-85EB3ADEDA33}" vid="{E4E49EB0-FB00-41F5-9359-4843D783A23D}"/>
+      <thm15:themeFamily xmlns:thm15="http://schemas.microsoft.com/office/thememl/2012/main" xmlns="" name="Organic" id="{28CDC826-8792-45C0-861B-85EB3ADEDA33}" vid="{E4E49EB0-FB00-41F5-9359-4843D783A23D}"/>
     </a:ext>
   </a:extLst>
 </a:theme>
@@ -8211,7 +10075,7 @@
     </a:clrScheme>
     <a:fontScheme name="Office">
       <a:majorFont>
-        <a:latin typeface="Calibri Light" panose="020F0302020204030204"/>
+        <a:latin typeface="Calibri Light"/>
         <a:ea typeface=""/>
         <a:cs typeface=""/>
         <a:font script="Jpan" typeface="ＭＳ Ｐゴシック"/>
@@ -8246,7 +10110,7 @@
         <a:font script="Geor" typeface="Sylfaen"/>
       </a:majorFont>
       <a:minorFont>
-        <a:latin typeface="Calibri" panose="020F0502020204030204"/>
+        <a:latin typeface="Calibri"/>
         <a:ea typeface=""/>
         <a:cs typeface=""/>
         <a:font script="Jpan" typeface="ＭＳ Ｐゴシック"/>
@@ -8423,7 +10287,7 @@
   <a:extraClrSchemeLst/>
   <a:extLst>
     <a:ext uri="{05A4C25C-085E-4340-85A3-A5531E510DB2}">
-      <thm15:themeFamily xmlns:thm15="http://schemas.microsoft.com/office/thememl/2012/main" name="Office Theme" id="{62F939B6-93AF-4DB8-9C6B-D6C7DFDC589F}" vid="{4A3C46E8-61CC-4603-A589-7422A47A8E4A}"/>
+      <thm15:themeFamily xmlns:thm15="http://schemas.microsoft.com/office/thememl/2012/main" xmlns="" name="Office Theme" id="{62F939B6-93AF-4DB8-9C6B-D6C7DFDC589F}" vid="{4A3C46E8-61CC-4603-A589-7422A47A8E4A}"/>
     </a:ext>
   </a:extLst>
 </a:theme>

</xml_diff>